<commit_message>
Section 5: Ride dynamics
Minor changes to last sections of Ride Dynamics notes (Ride Response) onwards.  Update lecture slides to include more of the detail from the notes (wheelbase filtering).
</commit_message>
<xml_diff>
--- a/docs/lectures/Ride Dynamics.pptx
+++ b/docs/lectures/Ride Dynamics.pptx
@@ -5,10 +5,10 @@
     <p:sldMasterId id="2147483648" r:id="rId1"/>
   </p:sldMasterIdLst>
   <p:notesMasterIdLst>
-    <p:notesMasterId r:id="rId19"/>
+    <p:notesMasterId r:id="rId21"/>
   </p:notesMasterIdLst>
   <p:handoutMasterIdLst>
-    <p:handoutMasterId r:id="rId20"/>
+    <p:handoutMasterId r:id="rId22"/>
   </p:handoutMasterIdLst>
   <p:sldIdLst>
     <p:sldId id="256" r:id="rId2"/>
@@ -26,8 +26,10 @@
     <p:sldId id="267" r:id="rId14"/>
     <p:sldId id="269" r:id="rId15"/>
     <p:sldId id="279" r:id="rId16"/>
-    <p:sldId id="272" r:id="rId17"/>
-    <p:sldId id="274" r:id="rId18"/>
+    <p:sldId id="281" r:id="rId17"/>
+    <p:sldId id="282" r:id="rId18"/>
+    <p:sldId id="272" r:id="rId19"/>
+    <p:sldId id="274" r:id="rId20"/>
   </p:sldIdLst>
   <p:sldSz cx="12192000" cy="6858000"/>
   <p:notesSz cx="7099300" cy="10234613"/>
@@ -962,7 +964,7 @@
           <a:p>
             <a:fld id="{6AD24EC9-7198-4B56-AEF9-BBEDF5640E20}" type="datetimeFigureOut">
               <a:rPr lang="en-GB" smtClean="0"/>
-              <a:t>12/10/2021</a:t>
+              <a:t>14/10/2021</a:t>
             </a:fld>
             <a:endParaRPr lang="en-GB"/>
           </a:p>
@@ -1127,7 +1129,7 @@
           <a:p>
             <a:fld id="{9DA14B43-C65A-4AE6-9D2C-F5DDC46BD098}" type="datetimeFigureOut">
               <a:rPr lang="en-GB" smtClean="0"/>
-              <a:t>12/10/2021</a:t>
+              <a:t>14/10/2021</a:t>
             </a:fld>
             <a:endParaRPr lang="en-GB"/>
           </a:p>
@@ -1568,6 +1570,254 @@
 </p:notes>
 </file>
 
+<file path=ppt/notesSlides/notesSlide3.xml><?xml version="1.0" encoding="utf-8"?>
+<p:notes xmlns:a="http://schemas.openxmlformats.org/drawingml/2006/main" xmlns:r="http://schemas.openxmlformats.org/officeDocument/2006/relationships" xmlns:p="http://schemas.openxmlformats.org/presentationml/2006/main">
+  <p:cSld>
+    <p:spTree>
+      <p:nvGrpSpPr>
+        <p:cNvPr id="1" name=""/>
+        <p:cNvGrpSpPr/>
+        <p:nvPr/>
+      </p:nvGrpSpPr>
+      <p:grpSpPr>
+        <a:xfrm>
+          <a:off x="0" y="0"/>
+          <a:ext cx="0" cy="0"/>
+          <a:chOff x="0" y="0"/>
+          <a:chExt cx="0" cy="0"/>
+        </a:xfrm>
+      </p:grpSpPr>
+      <p:sp>
+        <p:nvSpPr>
+          <p:cNvPr id="2" name="Slide Image Placeholder 1"/>
+          <p:cNvSpPr>
+            <a:spLocks noGrp="1" noRot="1" noChangeAspect="1"/>
+          </p:cNvSpPr>
+          <p:nvPr>
+            <p:ph type="sldImg"/>
+          </p:nvPr>
+        </p:nvSpPr>
+        <p:spPr/>
+      </p:sp>
+      <p:sp>
+        <p:nvSpPr>
+          <p:cNvPr id="3" name="Notes Placeholder 2"/>
+          <p:cNvSpPr>
+            <a:spLocks noGrp="1"/>
+          </p:cNvSpPr>
+          <p:nvPr>
+            <p:ph type="body" idx="1"/>
+          </p:nvPr>
+        </p:nvSpPr>
+        <p:spPr/>
+        <p:txBody>
+          <a:bodyPr/>
+          <a:lstStyle/>
+          <a:p>
+            <a:r>
+              <a:rPr lang="en-GB" sz="1200" b="0" i="0" u="none" strike="noStrike" kern="1200" dirty="0">
+                <a:solidFill>
+                  <a:schemeClr val="tx1"/>
+                </a:solidFill>
+                <a:effectLst/>
+                <a:latin typeface="+mn-lt"/>
+                <a:ea typeface="+mn-ea"/>
+                <a:cs typeface="+mn-cs"/>
+              </a:rPr>
+              <a:t>Figure 11 shows the effect of increasing </a:t>
+            </a:r>
+            <a:r>
+              <a:rPr lang="en-GB" dirty="0"/>
+              <a:t>Cs</a:t>
+            </a:r>
+            <a:r>
+              <a:rPr lang="en-GB" sz="1200" b="0" i="0" u="none" strike="noStrike" kern="1200" dirty="0">
+                <a:solidFill>
+                  <a:schemeClr val="tx1"/>
+                </a:solidFill>
+                <a:effectLst/>
+                <a:latin typeface="+mn-lt"/>
+                <a:ea typeface="+mn-ea"/>
+                <a:cs typeface="+mn-cs"/>
+              </a:rPr>
+              <a:t> to give damping ratio, </a:t>
+            </a:r>
+            <a:r>
+              <a:rPr lang="el-GR" dirty="0"/>
+              <a:t>ζ</a:t>
+            </a:r>
+            <a:r>
+              <a:rPr lang="el-GR" sz="1200" b="0" i="0" u="none" strike="noStrike" kern="1200" dirty="0">
+                <a:solidFill>
+                  <a:schemeClr val="tx1"/>
+                </a:solidFill>
+                <a:effectLst/>
+                <a:latin typeface="+mn-lt"/>
+                <a:ea typeface="+mn-ea"/>
+                <a:cs typeface="+mn-cs"/>
+              </a:rPr>
+              <a:t> </a:t>
+            </a:r>
+            <a:r>
+              <a:rPr lang="en-GB" sz="1200" b="0" i="0" u="none" strike="noStrike" kern="1200" dirty="0">
+                <a:solidFill>
+                  <a:schemeClr val="tx1"/>
+                </a:solidFill>
+                <a:effectLst/>
+                <a:latin typeface="+mn-lt"/>
+                <a:ea typeface="+mn-ea"/>
+                <a:cs typeface="+mn-cs"/>
+              </a:rPr>
+              <a:t>in the range 0.1 to 2. Note how at the extreme (200% damping) level, the </a:t>
+            </a:r>
+            <a:r>
+              <a:rPr lang="en-GB" sz="1200" b="0" i="1" u="none" strike="noStrike" kern="1200" dirty="0">
+                <a:solidFill>
+                  <a:schemeClr val="tx1"/>
+                </a:solidFill>
+                <a:effectLst/>
+                <a:latin typeface="+mn-lt"/>
+                <a:ea typeface="+mn-ea"/>
+                <a:cs typeface="+mn-cs"/>
+              </a:rPr>
+              <a:t>stiff</a:t>
+            </a:r>
+            <a:r>
+              <a:rPr lang="en-GB" sz="1200" b="0" i="0" u="none" strike="noStrike" kern="1200" dirty="0">
+                <a:solidFill>
+                  <a:schemeClr val="tx1"/>
+                </a:solidFill>
+                <a:effectLst/>
+                <a:latin typeface="+mn-lt"/>
+                <a:ea typeface="+mn-ea"/>
+                <a:cs typeface="+mn-cs"/>
+              </a:rPr>
+              <a:t> damper has effectively tied the body and wheel together, combining body bounce and wheel hop into one resonance at about 3.5Hz. This would be highly undesirable, due to its affect on the human body. Frequencies of 1Hz and 10Hz feel much better than 4Hz vertically.</a:t>
+            </a:r>
+            <a:endParaRPr lang="en-GB" dirty="0"/>
+          </a:p>
+        </p:txBody>
+      </p:sp>
+      <p:sp>
+        <p:nvSpPr>
+          <p:cNvPr id="4" name="Slide Number Placeholder 3"/>
+          <p:cNvSpPr>
+            <a:spLocks noGrp="1"/>
+          </p:cNvSpPr>
+          <p:nvPr>
+            <p:ph type="sldNum" sz="quarter" idx="5"/>
+          </p:nvPr>
+        </p:nvSpPr>
+        <p:spPr/>
+        <p:txBody>
+          <a:bodyPr/>
+          <a:lstStyle/>
+          <a:p>
+            <a:fld id="{7C970ED3-5561-46E0-A85F-5E16F88FFCA8}" type="slidenum">
+              <a:rPr lang="en-GB" smtClean="0"/>
+              <a:t>13</a:t>
+            </a:fld>
+            <a:endParaRPr lang="en-GB"/>
+          </a:p>
+        </p:txBody>
+      </p:sp>
+    </p:spTree>
+    <p:extLst>
+      <p:ext uri="{BB962C8B-B14F-4D97-AF65-F5344CB8AC3E}">
+        <p14:creationId xmlns:p14="http://schemas.microsoft.com/office/powerpoint/2010/main" val="2227747465"/>
+      </p:ext>
+    </p:extLst>
+  </p:cSld>
+  <p:clrMapOvr>
+    <a:masterClrMapping/>
+  </p:clrMapOvr>
+</p:notes>
+</file>
+
+<file path=ppt/notesSlides/notesSlide4.xml><?xml version="1.0" encoding="utf-8"?>
+<p:notes xmlns:a="http://schemas.openxmlformats.org/drawingml/2006/main" xmlns:r="http://schemas.openxmlformats.org/officeDocument/2006/relationships" xmlns:p="http://schemas.openxmlformats.org/presentationml/2006/main">
+  <p:cSld>
+    <p:spTree>
+      <p:nvGrpSpPr>
+        <p:cNvPr id="1" name=""/>
+        <p:cNvGrpSpPr/>
+        <p:nvPr/>
+      </p:nvGrpSpPr>
+      <p:grpSpPr>
+        <a:xfrm>
+          <a:off x="0" y="0"/>
+          <a:ext cx="0" cy="0"/>
+          <a:chOff x="0" y="0"/>
+          <a:chExt cx="0" cy="0"/>
+        </a:xfrm>
+      </p:grpSpPr>
+      <p:sp>
+        <p:nvSpPr>
+          <p:cNvPr id="2" name="Slide Image Placeholder 1"/>
+          <p:cNvSpPr>
+            <a:spLocks noGrp="1" noRot="1" noChangeAspect="1"/>
+          </p:cNvSpPr>
+          <p:nvPr>
+            <p:ph type="sldImg"/>
+          </p:nvPr>
+        </p:nvSpPr>
+        <p:spPr/>
+      </p:sp>
+      <p:sp>
+        <p:nvSpPr>
+          <p:cNvPr id="3" name="Notes Placeholder 2"/>
+          <p:cNvSpPr>
+            <a:spLocks noGrp="1"/>
+          </p:cNvSpPr>
+          <p:nvPr>
+            <p:ph type="body" idx="1"/>
+          </p:nvPr>
+        </p:nvSpPr>
+        <p:spPr/>
+        <p:txBody>
+          <a:bodyPr/>
+          <a:lstStyle/>
+          <a:p>
+            <a:endParaRPr lang="en-GB" dirty="0"/>
+          </a:p>
+        </p:txBody>
+      </p:sp>
+      <p:sp>
+        <p:nvSpPr>
+          <p:cNvPr id="4" name="Slide Number Placeholder 3"/>
+          <p:cNvSpPr>
+            <a:spLocks noGrp="1"/>
+          </p:cNvSpPr>
+          <p:nvPr>
+            <p:ph type="sldNum" sz="quarter" idx="5"/>
+          </p:nvPr>
+        </p:nvSpPr>
+        <p:spPr/>
+        <p:txBody>
+          <a:bodyPr/>
+          <a:lstStyle/>
+          <a:p>
+            <a:fld id="{7C970ED3-5561-46E0-A85F-5E16F88FFCA8}" type="slidenum">
+              <a:rPr lang="en-GB" smtClean="0"/>
+              <a:t>17</a:t>
+            </a:fld>
+            <a:endParaRPr lang="en-GB"/>
+          </a:p>
+        </p:txBody>
+      </p:sp>
+    </p:spTree>
+    <p:extLst>
+      <p:ext uri="{BB962C8B-B14F-4D97-AF65-F5344CB8AC3E}">
+        <p14:creationId xmlns:p14="http://schemas.microsoft.com/office/powerpoint/2010/main" val="1654558621"/>
+      </p:ext>
+    </p:extLst>
+  </p:cSld>
+  <p:clrMapOvr>
+    <a:masterClrMapping/>
+  </p:clrMapOvr>
+</p:notes>
+</file>
+
 <file path=ppt/slideLayouts/slideLayout1.xml><?xml version="1.0" encoding="utf-8"?>
 <p:sldLayout xmlns:a="http://schemas.openxmlformats.org/drawingml/2006/main" xmlns:r="http://schemas.openxmlformats.org/officeDocument/2006/relationships" xmlns:p="http://schemas.openxmlformats.org/presentationml/2006/main" type="title" preserve="1">
   <p:cSld name="Title Slide">
@@ -1699,7 +1949,7 @@
           <a:p>
             <a:fld id="{EADA9985-F9B8-4E11-8A40-B153142C5EE0}" type="datetimeFigureOut">
               <a:rPr lang="en-GB" smtClean="0"/>
-              <a:t>12/10/2021</a:t>
+              <a:t>14/10/2021</a:t>
             </a:fld>
             <a:endParaRPr lang="en-GB"/>
           </a:p>
@@ -1944,7 +2194,7 @@
           <a:p>
             <a:fld id="{EADA9985-F9B8-4E11-8A40-B153142C5EE0}" type="datetimeFigureOut">
               <a:rPr lang="en-GB" smtClean="0"/>
-              <a:t>12/10/2021</a:t>
+              <a:t>14/10/2021</a:t>
             </a:fld>
             <a:endParaRPr lang="en-GB"/>
           </a:p>
@@ -2124,7 +2374,7 @@
           <a:p>
             <a:fld id="{EADA9985-F9B8-4E11-8A40-B153142C5EE0}" type="datetimeFigureOut">
               <a:rPr lang="en-GB" smtClean="0"/>
-              <a:t>12/10/2021</a:t>
+              <a:t>14/10/2021</a:t>
             </a:fld>
             <a:endParaRPr lang="en-GB"/>
           </a:p>
@@ -2294,7 +2544,7 @@
           <a:p>
             <a:fld id="{EADA9985-F9B8-4E11-8A40-B153142C5EE0}" type="datetimeFigureOut">
               <a:rPr lang="en-GB" smtClean="0"/>
-              <a:t>12/10/2021</a:t>
+              <a:t>14/10/2021</a:t>
             </a:fld>
             <a:endParaRPr lang="en-GB"/>
           </a:p>
@@ -2576,7 +2826,7 @@
           <a:p>
             <a:fld id="{EADA9985-F9B8-4E11-8A40-B153142C5EE0}" type="datetimeFigureOut">
               <a:rPr lang="en-GB" smtClean="0"/>
-              <a:t>12/10/2021</a:t>
+              <a:t>14/10/2021</a:t>
             </a:fld>
             <a:endParaRPr lang="en-GB"/>
           </a:p>
@@ -2808,7 +3058,7 @@
           <a:p>
             <a:fld id="{EADA9985-F9B8-4E11-8A40-B153142C5EE0}" type="datetimeFigureOut">
               <a:rPr lang="en-GB" smtClean="0"/>
-              <a:t>12/10/2021</a:t>
+              <a:t>14/10/2021</a:t>
             </a:fld>
             <a:endParaRPr lang="en-GB"/>
           </a:p>
@@ -3175,7 +3425,7 @@
           <a:p>
             <a:fld id="{EADA9985-F9B8-4E11-8A40-B153142C5EE0}" type="datetimeFigureOut">
               <a:rPr lang="en-GB" smtClean="0"/>
-              <a:t>12/10/2021</a:t>
+              <a:t>14/10/2021</a:t>
             </a:fld>
             <a:endParaRPr lang="en-GB"/>
           </a:p>
@@ -3293,7 +3543,7 @@
           <a:p>
             <a:fld id="{EADA9985-F9B8-4E11-8A40-B153142C5EE0}" type="datetimeFigureOut">
               <a:rPr lang="en-GB" smtClean="0"/>
-              <a:t>12/10/2021</a:t>
+              <a:t>14/10/2021</a:t>
             </a:fld>
             <a:endParaRPr lang="en-GB"/>
           </a:p>
@@ -3388,7 +3638,7 @@
           <a:p>
             <a:fld id="{EADA9985-F9B8-4E11-8A40-B153142C5EE0}" type="datetimeFigureOut">
               <a:rPr lang="en-GB" smtClean="0"/>
-              <a:t>12/10/2021</a:t>
+              <a:t>14/10/2021</a:t>
             </a:fld>
             <a:endParaRPr lang="en-GB"/>
           </a:p>
@@ -3665,7 +3915,7 @@
           <a:p>
             <a:fld id="{EADA9985-F9B8-4E11-8A40-B153142C5EE0}" type="datetimeFigureOut">
               <a:rPr lang="en-GB" smtClean="0"/>
-              <a:t>12/10/2021</a:t>
+              <a:t>14/10/2021</a:t>
             </a:fld>
             <a:endParaRPr lang="en-GB"/>
           </a:p>
@@ -3918,7 +4168,7 @@
           <a:p>
             <a:fld id="{EADA9985-F9B8-4E11-8A40-B153142C5EE0}" type="datetimeFigureOut">
               <a:rPr lang="en-GB" smtClean="0"/>
-              <a:t>12/10/2021</a:t>
+              <a:t>14/10/2021</a:t>
             </a:fld>
             <a:endParaRPr lang="en-GB"/>
           </a:p>
@@ -4131,7 +4381,7 @@
           <a:p>
             <a:fld id="{EADA9985-F9B8-4E11-8A40-B153142C5EE0}" type="datetimeFigureOut">
               <a:rPr lang="en-GB" smtClean="0"/>
-              <a:t>12/10/2021</a:t>
+              <a:t>14/10/2021</a:t>
             </a:fld>
             <a:endParaRPr lang="en-GB"/>
           </a:p>
@@ -5795,8 +6045,8 @@
         </p:blipFill>
         <p:spPr>
           <a:xfrm>
-            <a:off x="6757175" y="2015887"/>
-            <a:ext cx="5174475" cy="3232150"/>
+            <a:off x="5972175" y="2015886"/>
+            <a:ext cx="5959475" cy="3722487"/>
           </a:xfrm>
           <a:prstGeom prst="rect">
             <a:avLst/>
@@ -5865,8 +6115,8 @@
           </a:p>
         </p:txBody>
       </p:sp>
-      <mc:AlternateContent xmlns:mc="http://schemas.openxmlformats.org/markup-compatibility/2006" xmlns:a14="http://schemas.microsoft.com/office/drawing/2010/main">
-        <mc:Choice Requires="a14">
+      <mc:AlternateContent xmlns:mc="http://schemas.openxmlformats.org/markup-compatibility/2006">
+        <mc:Choice xmlns:a14="http://schemas.microsoft.com/office/drawing/2010/main" Requires="a14">
           <p:sp>
             <p:nvSpPr>
               <p:cNvPr id="7" name="TextBox 6">
@@ -5881,7 +6131,7 @@
             </p:nvSpPr>
             <p:spPr>
               <a:xfrm>
-                <a:off x="6958566" y="5248037"/>
+                <a:off x="6582109" y="5694239"/>
                 <a:ext cx="4771691" cy="369332"/>
               </a:xfrm>
               <a:prstGeom prst="rect">
@@ -5969,7 +6219,7 @@
             </p:txBody>
           </p:sp>
         </mc:Choice>
-        <mc:Fallback xmlns="">
+        <mc:Fallback>
           <p:sp>
             <p:nvSpPr>
               <p:cNvPr id="7" name="TextBox 6">
@@ -5986,7 +6236,7 @@
             </p:nvSpPr>
             <p:spPr>
               <a:xfrm>
-                <a:off x="6958566" y="5248037"/>
+                <a:off x="6582109" y="5694239"/>
                 <a:ext cx="4771691" cy="369332"/>
               </a:xfrm>
               <a:prstGeom prst="rect">
@@ -5995,7 +6245,7 @@
               <a:blipFill>
                 <a:blip r:embed="rId7"/>
                 <a:stretch>
-                  <a:fillRect l="-1061" t="-10000" r="-265" b="-26667"/>
+                  <a:fillRect l="-1061" t="-6667" b="-26667"/>
                 </a:stretch>
               </a:blipFill>
             </p:spPr>
@@ -6004,7 +6254,234 @@
               <a:lstStyle/>
               <a:p>
                 <a:r>
-                  <a:rPr lang="en-US">
+                  <a:rPr lang="en-GB">
+                    <a:noFill/>
+                  </a:rPr>
+                  <a:t> </a:t>
+                </a:r>
+              </a:p>
+            </p:txBody>
+          </p:sp>
+        </mc:Fallback>
+      </mc:AlternateContent>
+      <p:cxnSp>
+        <p:nvCxnSpPr>
+          <p:cNvPr id="9" name="Straight Arrow Connector 8">
+            <a:extLst>
+              <a:ext uri="{FF2B5EF4-FFF2-40B4-BE49-F238E27FC236}">
+                <a16:creationId xmlns:a16="http://schemas.microsoft.com/office/drawing/2014/main" id="{FA3BEC39-0B08-9D45-9796-AEFBBFC3880F}"/>
+              </a:ext>
+            </a:extLst>
+          </p:cNvPr>
+          <p:cNvCxnSpPr>
+            <a:cxnSpLocks/>
+          </p:cNvCxnSpPr>
+          <p:nvPr/>
+        </p:nvCxnSpPr>
+        <p:spPr>
+          <a:xfrm flipH="1">
+            <a:off x="6869152" y="4023635"/>
+            <a:ext cx="1950998" cy="526063"/>
+          </a:xfrm>
+          <a:prstGeom prst="straightConnector1">
+            <a:avLst/>
+          </a:prstGeom>
+          <a:ln w="38100">
+            <a:tailEnd type="triangle" w="lg" len="lg"/>
+          </a:ln>
+        </p:spPr>
+        <p:style>
+          <a:lnRef idx="1">
+            <a:schemeClr val="accent1"/>
+          </a:lnRef>
+          <a:fillRef idx="0">
+            <a:schemeClr val="accent1"/>
+          </a:fillRef>
+          <a:effectRef idx="0">
+            <a:schemeClr val="accent1"/>
+          </a:effectRef>
+          <a:fontRef idx="minor">
+            <a:schemeClr val="tx1"/>
+          </a:fontRef>
+        </p:style>
+      </p:cxnSp>
+      <mc:AlternateContent xmlns:mc="http://schemas.openxmlformats.org/markup-compatibility/2006">
+        <mc:Choice xmlns:a14="http://schemas.microsoft.com/office/drawing/2010/main" Requires="a14">
+          <p:sp>
+            <p:nvSpPr>
+              <p:cNvPr id="11" name="TextBox 10">
+                <a:extLst>
+                  <a:ext uri="{FF2B5EF4-FFF2-40B4-BE49-F238E27FC236}">
+                    <a16:creationId xmlns:a16="http://schemas.microsoft.com/office/drawing/2014/main" id="{744C75B5-7BDA-244A-BE63-11AA50EEFE58}"/>
+                  </a:ext>
+                </a:extLst>
+              </p:cNvPr>
+              <p:cNvSpPr txBox="1"/>
+              <p:nvPr/>
+            </p:nvSpPr>
+            <p:spPr>
+              <a:xfrm>
+                <a:off x="8943394" y="3315648"/>
+                <a:ext cx="1950998" cy="1477328"/>
+              </a:xfrm>
+              <a:prstGeom prst="rect">
+                <a:avLst/>
+              </a:prstGeom>
+              <a:noFill/>
+            </p:spPr>
+            <p:txBody>
+              <a:bodyPr wrap="square" rtlCol="0">
+                <a:spAutoFit/>
+              </a:bodyPr>
+              <a:lstStyle/>
+              <a:p>
+                <a:r>
+                  <a:rPr lang="en-GB" b="1" dirty="0">
+                    <a:solidFill>
+                      <a:schemeClr val="accent5"/>
+                    </a:solidFill>
+                  </a:rPr>
+                  <a:t>Note lower amplitude as </a:t>
+                </a:r>
+              </a:p>
+              <a:p>
+                <a14:m>
+                  <m:oMath xmlns:m="http://schemas.openxmlformats.org/officeDocument/2006/math">
+                    <m:sSub>
+                      <m:sSubPr>
+                        <m:ctrlPr>
+                          <a:rPr lang="en-GB" b="1" i="1" smtClean="0">
+                            <a:solidFill>
+                              <a:schemeClr val="accent5"/>
+                            </a:solidFill>
+                            <a:latin typeface="Cambria Math" panose="02040503050406030204" pitchFamily="18" charset="0"/>
+                          </a:rPr>
+                        </m:ctrlPr>
+                      </m:sSubPr>
+                      <m:e>
+                        <m:r>
+                          <a:rPr lang="en-GB" b="1" i="1" smtClean="0">
+                            <a:solidFill>
+                              <a:schemeClr val="accent5"/>
+                            </a:solidFill>
+                            <a:latin typeface="Cambria Math" panose="02040503050406030204" pitchFamily="18" charset="0"/>
+                          </a:rPr>
+                          <m:t>𝝎</m:t>
+                        </m:r>
+                      </m:e>
+                      <m:sub>
+                        <m:r>
+                          <a:rPr lang="en-GB" b="1" i="1" smtClean="0">
+                            <a:solidFill>
+                              <a:schemeClr val="accent5"/>
+                            </a:solidFill>
+                            <a:latin typeface="Cambria Math" panose="02040503050406030204" pitchFamily="18" charset="0"/>
+                          </a:rPr>
+                          <m:t>𝒏</m:t>
+                        </m:r>
+                      </m:sub>
+                    </m:sSub>
+                  </m:oMath>
+                </a14:m>
+                <a:r>
+                  <a:rPr lang="en-GB" b="1" dirty="0">
+                    <a:solidFill>
+                      <a:schemeClr val="accent5"/>
+                    </a:solidFill>
+                  </a:rPr>
+                  <a:t>is tuned down through </a:t>
+                </a:r>
+              </a:p>
+              <a:p>
+                <a:pPr/>
+                <a14:m>
+                  <m:oMathPara xmlns:m="http://schemas.openxmlformats.org/officeDocument/2006/math">
+                    <m:oMathParaPr>
+                      <m:jc m:val="centerGroup"/>
+                    </m:oMathParaPr>
+                    <m:oMath xmlns:m="http://schemas.openxmlformats.org/officeDocument/2006/math">
+                      <m:sSub>
+                        <m:sSubPr>
+                          <m:ctrlPr>
+                            <a:rPr lang="en-GB" b="1" i="1" smtClean="0">
+                              <a:solidFill>
+                                <a:schemeClr val="accent5"/>
+                              </a:solidFill>
+                              <a:latin typeface="Cambria Math" panose="02040503050406030204" pitchFamily="18" charset="0"/>
+                            </a:rPr>
+                          </m:ctrlPr>
+                        </m:sSubPr>
+                        <m:e>
+                          <m:r>
+                            <a:rPr lang="en-GB" b="1" i="1" smtClean="0">
+                              <a:solidFill>
+                                <a:schemeClr val="accent5"/>
+                              </a:solidFill>
+                              <a:latin typeface="Cambria Math" panose="02040503050406030204" pitchFamily="18" charset="0"/>
+                            </a:rPr>
+                            <m:t>𝑲</m:t>
+                          </m:r>
+                        </m:e>
+                        <m:sub>
+                          <m:r>
+                            <a:rPr lang="en-GB" b="1" i="1" smtClean="0">
+                              <a:solidFill>
+                                <a:schemeClr val="accent5"/>
+                              </a:solidFill>
+                              <a:latin typeface="Cambria Math" panose="02040503050406030204" pitchFamily="18" charset="0"/>
+                            </a:rPr>
+                            <m:t>𝒔</m:t>
+                          </m:r>
+                        </m:sub>
+                      </m:sSub>
+                    </m:oMath>
+                  </m:oMathPara>
+                </a14:m>
+                <a:endParaRPr lang="en-GB" b="1" dirty="0">
+                  <a:solidFill>
+                    <a:schemeClr val="accent5"/>
+                  </a:solidFill>
+                </a:endParaRPr>
+              </a:p>
+            </p:txBody>
+          </p:sp>
+        </mc:Choice>
+        <mc:Fallback>
+          <p:sp>
+            <p:nvSpPr>
+              <p:cNvPr id="11" name="TextBox 10">
+                <a:extLst>
+                  <a:ext uri="{FF2B5EF4-FFF2-40B4-BE49-F238E27FC236}">
+                    <a16:creationId xmlns:a16="http://schemas.microsoft.com/office/drawing/2014/main" id="{744C75B5-7BDA-244A-BE63-11AA50EEFE58}"/>
+                  </a:ext>
+                </a:extLst>
+              </p:cNvPr>
+              <p:cNvSpPr txBox="1">
+                <a:spLocks noRot="1" noChangeAspect="1" noMove="1" noResize="1" noEditPoints="1" noAdjustHandles="1" noChangeArrowheads="1" noChangeShapeType="1" noTextEdit="1"/>
+              </p:cNvSpPr>
+              <p:nvPr/>
+            </p:nvSpPr>
+            <p:spPr>
+              <a:xfrm>
+                <a:off x="8943394" y="3315648"/>
+                <a:ext cx="1950998" cy="1477328"/>
+              </a:xfrm>
+              <a:prstGeom prst="rect">
+                <a:avLst/>
+              </a:prstGeom>
+              <a:blipFill>
+                <a:blip r:embed="rId8"/>
+                <a:stretch>
+                  <a:fillRect l="-2597" t="-2564"/>
+                </a:stretch>
+              </a:blipFill>
+            </p:spPr>
+            <p:txBody>
+              <a:bodyPr/>
+              <a:lstStyle/>
+              <a:p>
+                <a:r>
+                  <a:rPr lang="en-GB">
                     <a:noFill/>
                   </a:rPr>
                   <a:t> </a:t>
@@ -6108,13 +6585,13 @@
           <a:p>
             <a:r>
               <a:rPr lang="en-US" dirty="0"/>
-              <a:t>By changing damping also the peak body response can be also reduced.</a:t>
+              <a:t>By changing damping also, the peak body response can be reduced.</a:t>
             </a:r>
           </a:p>
           <a:p>
             <a:r>
               <a:rPr lang="en-US" dirty="0"/>
-              <a:t>There are other consequences though for the lower frequencies whose transmission to the body becomes greater</a:t>
+              <a:t>There are other consequences though for the higher frequencies whose transmission to the body becomes greater.</a:t>
             </a:r>
           </a:p>
         </p:txBody>
@@ -6134,7 +6611,7 @@
           <p:nvPr/>
         </p:nvPicPr>
         <p:blipFill>
-          <a:blip r:embed="rId2"/>
+          <a:blip r:embed="rId3"/>
           <a:stretch>
             <a:fillRect/>
           </a:stretch>
@@ -6403,6 +6880,19 @@
               <a:t>Half car model required for pitch and bounce analysis</a:t>
             </a:r>
           </a:p>
+          <a:p>
+            <a:r>
+              <a:rPr lang="en-GB" dirty="0"/>
+              <a:t>What you feel depends on where you are (centre vs one end or the other)</a:t>
+            </a:r>
+          </a:p>
+          <a:p>
+            <a:r>
+              <a:rPr lang="en-GB" dirty="0"/>
+              <a:t>Principle problem with pitch is the fore-aft motion it causes – nausea!</a:t>
+            </a:r>
+            <a:endParaRPr lang="en-US" dirty="0"/>
+          </a:p>
         </p:txBody>
       </p:sp>
       <p:pic>
@@ -6478,6 +6968,294 @@
           <p:cNvPr id="2" name="Title 1">
             <a:extLst>
               <a:ext uri="{FF2B5EF4-FFF2-40B4-BE49-F238E27FC236}">
+                <a16:creationId xmlns:a16="http://schemas.microsoft.com/office/drawing/2014/main" id="{83220177-3B61-EE40-A638-F648F31BEC4C}"/>
+              </a:ext>
+            </a:extLst>
+          </p:cNvPr>
+          <p:cNvSpPr>
+            <a:spLocks noGrp="1"/>
+          </p:cNvSpPr>
+          <p:nvPr>
+            <p:ph type="title"/>
+          </p:nvPr>
+        </p:nvSpPr>
+        <p:spPr/>
+        <p:txBody>
+          <a:bodyPr/>
+          <a:lstStyle/>
+          <a:p>
+            <a:r>
+              <a:rPr lang="en-GB" dirty="0"/>
+              <a:t>Bounce and Pitch: Wheelbase Filtering</a:t>
+            </a:r>
+          </a:p>
+        </p:txBody>
+      </p:sp>
+      <p:sp>
+        <p:nvSpPr>
+          <p:cNvPr id="3" name="Content Placeholder 2">
+            <a:extLst>
+              <a:ext uri="{FF2B5EF4-FFF2-40B4-BE49-F238E27FC236}">
+                <a16:creationId xmlns:a16="http://schemas.microsoft.com/office/drawing/2014/main" id="{C9BFEAAA-C842-F143-AA37-FE0DB4D1B35A}"/>
+              </a:ext>
+            </a:extLst>
+          </p:cNvPr>
+          <p:cNvSpPr>
+            <a:spLocks noGrp="1"/>
+          </p:cNvSpPr>
+          <p:nvPr>
+            <p:ph idx="1"/>
+          </p:nvPr>
+        </p:nvSpPr>
+        <p:spPr>
+          <a:xfrm>
+            <a:off x="838200" y="1825625"/>
+            <a:ext cx="5540298" cy="4351338"/>
+          </a:xfrm>
+        </p:spPr>
+        <p:txBody>
+          <a:bodyPr/>
+          <a:lstStyle/>
+          <a:p>
+            <a:r>
+              <a:rPr lang="en-GB" dirty="0"/>
+              <a:t>Spacing of the front and rear suspensions can couple with road ‘wavelength’.</a:t>
+            </a:r>
+          </a:p>
+          <a:p>
+            <a:r>
+              <a:rPr lang="en-GB" dirty="0"/>
+              <a:t>Very few roads are sinusoidal!</a:t>
+            </a:r>
+          </a:p>
+        </p:txBody>
+      </p:sp>
+      <p:pic>
+        <p:nvPicPr>
+          <p:cNvPr id="1026" name="Picture 2">
+            <a:extLst>
+              <a:ext uri="{FF2B5EF4-FFF2-40B4-BE49-F238E27FC236}">
+                <a16:creationId xmlns:a16="http://schemas.microsoft.com/office/drawing/2014/main" id="{EE6C386A-5310-604C-AFE2-3226FCE18253}"/>
+              </a:ext>
+            </a:extLst>
+          </p:cNvPr>
+          <p:cNvPicPr>
+            <a:picLocks noChangeAspect="1" noChangeArrowheads="1"/>
+          </p:cNvPicPr>
+          <p:nvPr/>
+        </p:nvPicPr>
+        <p:blipFill>
+          <a:blip r:embed="rId2">
+            <a:extLst>
+              <a:ext uri="{28A0092B-C50C-407E-A947-70E740481C1C}">
+                <a14:useLocalDpi xmlns:a14="http://schemas.microsoft.com/office/drawing/2010/main" val="0"/>
+              </a:ext>
+            </a:extLst>
+          </a:blip>
+          <a:srcRect/>
+          <a:stretch>
+            <a:fillRect/>
+          </a:stretch>
+        </p:blipFill>
+        <p:spPr bwMode="auto">
+          <a:xfrm>
+            <a:off x="6899507" y="1825625"/>
+            <a:ext cx="4764668" cy="3725970"/>
+          </a:xfrm>
+          <a:prstGeom prst="rect">
+            <a:avLst/>
+          </a:prstGeom>
+          <a:noFill/>
+          <a:extLst>
+            <a:ext uri="{909E8E84-426E-40DD-AFC4-6F175D3DCCD1}">
+              <a14:hiddenFill xmlns:a14="http://schemas.microsoft.com/office/drawing/2010/main">
+                <a:solidFill>
+                  <a:srgbClr val="FFFFFF"/>
+                </a:solidFill>
+              </a14:hiddenFill>
+            </a:ext>
+          </a:extLst>
+        </p:spPr>
+      </p:pic>
+    </p:spTree>
+    <p:extLst>
+      <p:ext uri="{BB962C8B-B14F-4D97-AF65-F5344CB8AC3E}">
+        <p14:creationId xmlns:p14="http://schemas.microsoft.com/office/powerpoint/2010/main" val="1766054679"/>
+      </p:ext>
+    </p:extLst>
+  </p:cSld>
+  <p:clrMapOvr>
+    <a:masterClrMapping/>
+  </p:clrMapOvr>
+</p:sld>
+</file>
+
+<file path=ppt/slides/slide17.xml><?xml version="1.0" encoding="utf-8"?>
+<p:sld xmlns:a="http://schemas.openxmlformats.org/drawingml/2006/main" xmlns:r="http://schemas.openxmlformats.org/officeDocument/2006/relationships" xmlns:p="http://schemas.openxmlformats.org/presentationml/2006/main">
+  <p:cSld>
+    <p:spTree>
+      <p:nvGrpSpPr>
+        <p:cNvPr id="1" name=""/>
+        <p:cNvGrpSpPr/>
+        <p:nvPr/>
+      </p:nvGrpSpPr>
+      <p:grpSpPr>
+        <a:xfrm>
+          <a:off x="0" y="0"/>
+          <a:ext cx="0" cy="0"/>
+          <a:chOff x="0" y="0"/>
+          <a:chExt cx="0" cy="0"/>
+        </a:xfrm>
+      </p:grpSpPr>
+      <p:sp>
+        <p:nvSpPr>
+          <p:cNvPr id="2" name="Title 1">
+            <a:extLst>
+              <a:ext uri="{FF2B5EF4-FFF2-40B4-BE49-F238E27FC236}">
+                <a16:creationId xmlns:a16="http://schemas.microsoft.com/office/drawing/2014/main" id="{794C4DAA-4DB2-024D-B87C-B1CF0E76C9ED}"/>
+              </a:ext>
+            </a:extLst>
+          </p:cNvPr>
+          <p:cNvSpPr>
+            <a:spLocks noGrp="1"/>
+          </p:cNvSpPr>
+          <p:nvPr>
+            <p:ph type="title"/>
+          </p:nvPr>
+        </p:nvSpPr>
+        <p:spPr/>
+        <p:txBody>
+          <a:bodyPr/>
+          <a:lstStyle/>
+          <a:p>
+            <a:r>
+              <a:rPr lang="en-GB" dirty="0"/>
+              <a:t>Bounce and Pitch: Ride Rates</a:t>
+            </a:r>
+          </a:p>
+        </p:txBody>
+      </p:sp>
+      <p:sp>
+        <p:nvSpPr>
+          <p:cNvPr id="3" name="Content Placeholder 2">
+            <a:extLst>
+              <a:ext uri="{FF2B5EF4-FFF2-40B4-BE49-F238E27FC236}">
+                <a16:creationId xmlns:a16="http://schemas.microsoft.com/office/drawing/2014/main" id="{859E6F26-ABC9-7B49-B0A0-44A6C2EF8CA7}"/>
+              </a:ext>
+            </a:extLst>
+          </p:cNvPr>
+          <p:cNvSpPr>
+            <a:spLocks noGrp="1"/>
+          </p:cNvSpPr>
+          <p:nvPr>
+            <p:ph idx="1"/>
+          </p:nvPr>
+        </p:nvSpPr>
+        <p:spPr>
+          <a:xfrm>
+            <a:off x="838200" y="4683511"/>
+            <a:ext cx="10515600" cy="2170655"/>
+          </a:xfrm>
+        </p:spPr>
+        <p:txBody>
+          <a:bodyPr/>
+          <a:lstStyle/>
+          <a:p>
+            <a:r>
+              <a:rPr lang="en-GB" dirty="0"/>
+              <a:t>By making front ride rate lower at the front it is possible to reduce the discomfort of pitching.</a:t>
+            </a:r>
+          </a:p>
+          <a:p>
+            <a:r>
+              <a:rPr lang="en-GB" dirty="0"/>
+              <a:t>As you hit a bump this induces pitch but resolves to bounce as the rear end ‘catches up’ with the front.</a:t>
+            </a:r>
+          </a:p>
+        </p:txBody>
+      </p:sp>
+      <p:pic>
+        <p:nvPicPr>
+          <p:cNvPr id="2050" name="Picture 2" descr="image">
+            <a:extLst>
+              <a:ext uri="{FF2B5EF4-FFF2-40B4-BE49-F238E27FC236}">
+                <a16:creationId xmlns:a16="http://schemas.microsoft.com/office/drawing/2014/main" id="{C88E9259-114F-8847-967F-DA8C9CD1E1A5}"/>
+              </a:ext>
+            </a:extLst>
+          </p:cNvPr>
+          <p:cNvPicPr>
+            <a:picLocks noChangeAspect="1" noChangeArrowheads="1"/>
+          </p:cNvPicPr>
+          <p:nvPr/>
+        </p:nvPicPr>
+        <p:blipFill>
+          <a:blip r:embed="rId3">
+            <a:extLst>
+              <a:ext uri="{28A0092B-C50C-407E-A947-70E740481C1C}">
+                <a14:useLocalDpi xmlns:a14="http://schemas.microsoft.com/office/drawing/2010/main" val="0"/>
+              </a:ext>
+            </a:extLst>
+          </a:blip>
+          <a:srcRect/>
+          <a:stretch>
+            <a:fillRect/>
+          </a:stretch>
+        </p:blipFill>
+        <p:spPr bwMode="auto">
+          <a:xfrm>
+            <a:off x="2321711" y="1690688"/>
+            <a:ext cx="7548578" cy="2798282"/>
+          </a:xfrm>
+          <a:prstGeom prst="rect">
+            <a:avLst/>
+          </a:prstGeom>
+          <a:noFill/>
+          <a:extLst>
+            <a:ext uri="{909E8E84-426E-40DD-AFC4-6F175D3DCCD1}">
+              <a14:hiddenFill xmlns:a14="http://schemas.microsoft.com/office/drawing/2010/main">
+                <a:solidFill>
+                  <a:srgbClr val="FFFFFF"/>
+                </a:solidFill>
+              </a14:hiddenFill>
+            </a:ext>
+          </a:extLst>
+        </p:spPr>
+      </p:pic>
+    </p:spTree>
+    <p:extLst>
+      <p:ext uri="{BB962C8B-B14F-4D97-AF65-F5344CB8AC3E}">
+        <p14:creationId xmlns:p14="http://schemas.microsoft.com/office/powerpoint/2010/main" val="138039765"/>
+      </p:ext>
+    </p:extLst>
+  </p:cSld>
+  <p:clrMapOvr>
+    <a:masterClrMapping/>
+  </p:clrMapOvr>
+</p:sld>
+</file>
+
+<file path=ppt/slides/slide18.xml><?xml version="1.0" encoding="utf-8"?>
+<p:sld xmlns:a="http://schemas.openxmlformats.org/drawingml/2006/main" xmlns:r="http://schemas.openxmlformats.org/officeDocument/2006/relationships" xmlns:p="http://schemas.openxmlformats.org/presentationml/2006/main">
+  <p:cSld>
+    <p:spTree>
+      <p:nvGrpSpPr>
+        <p:cNvPr id="1" name=""/>
+        <p:cNvGrpSpPr/>
+        <p:nvPr/>
+      </p:nvGrpSpPr>
+      <p:grpSpPr>
+        <a:xfrm>
+          <a:off x="0" y="0"/>
+          <a:ext cx="0" cy="0"/>
+          <a:chOff x="0" y="0"/>
+          <a:chExt cx="0" cy="0"/>
+        </a:xfrm>
+      </p:grpSpPr>
+      <p:sp>
+        <p:nvSpPr>
+          <p:cNvPr id="2" name="Title 1">
+            <a:extLst>
+              <a:ext uri="{FF2B5EF4-FFF2-40B4-BE49-F238E27FC236}">
                 <a16:creationId xmlns:a16="http://schemas.microsoft.com/office/drawing/2014/main" id="{DDA00932-AFD3-5341-95B7-BF004A8A4924}"/>
               </a:ext>
             </a:extLst>
@@ -6591,7 +7369,7 @@
 </p:sld>
 </file>
 
-<file path=ppt/slides/slide17.xml><?xml version="1.0" encoding="utf-8"?>
+<file path=ppt/slides/slide19.xml><?xml version="1.0" encoding="utf-8"?>
 <p:sld xmlns:a="http://schemas.openxmlformats.org/drawingml/2006/main" xmlns:r="http://schemas.openxmlformats.org/officeDocument/2006/relationships" xmlns:p="http://schemas.openxmlformats.org/presentationml/2006/main">
   <p:cSld>
     <p:spTree>

</xml_diff>

<commit_message>
Ride dynamics lecture slides
Updated second half of lecture with some annotations on the figures (ride response).
</commit_message>
<xml_diff>
--- a/docs/lectures/Ride Dynamics.pptx
+++ b/docs/lectures/Ride Dynamics.pptx
@@ -5,10 +5,10 @@
     <p:sldMasterId id="2147483648" r:id="rId1"/>
   </p:sldMasterIdLst>
   <p:notesMasterIdLst>
-    <p:notesMasterId r:id="rId21"/>
+    <p:notesMasterId r:id="rId22"/>
   </p:notesMasterIdLst>
   <p:handoutMasterIdLst>
-    <p:handoutMasterId r:id="rId22"/>
+    <p:handoutMasterId r:id="rId23"/>
   </p:handoutMasterIdLst>
   <p:sldIdLst>
     <p:sldId id="256" r:id="rId2"/>
@@ -29,7 +29,8 @@
     <p:sldId id="281" r:id="rId17"/>
     <p:sldId id="282" r:id="rId18"/>
     <p:sldId id="272" r:id="rId19"/>
-    <p:sldId id="274" r:id="rId20"/>
+    <p:sldId id="283" r:id="rId20"/>
+    <p:sldId id="274" r:id="rId21"/>
   </p:sldIdLst>
   <p:sldSz cx="12192000" cy="6858000"/>
   <p:notesSz cx="7099300" cy="10234613"/>
@@ -964,7 +965,7 @@
           <a:p>
             <a:fld id="{6AD24EC9-7198-4B56-AEF9-BBEDF5640E20}" type="datetimeFigureOut">
               <a:rPr lang="en-GB" smtClean="0"/>
-              <a:t>14/10/2021</a:t>
+              <a:t>19/10/2021</a:t>
             </a:fld>
             <a:endParaRPr lang="en-GB"/>
           </a:p>
@@ -1129,7 +1130,7 @@
           <a:p>
             <a:fld id="{9DA14B43-C65A-4AE6-9D2C-F5DDC46BD098}" type="datetimeFigureOut">
               <a:rPr lang="en-GB" smtClean="0"/>
-              <a:t>14/10/2021</a:t>
+              <a:t>19/10/2021</a:t>
             </a:fld>
             <a:endParaRPr lang="en-GB"/>
           </a:p>
@@ -1949,7 +1950,7 @@
           <a:p>
             <a:fld id="{EADA9985-F9B8-4E11-8A40-B153142C5EE0}" type="datetimeFigureOut">
               <a:rPr lang="en-GB" smtClean="0"/>
-              <a:t>14/10/2021</a:t>
+              <a:t>19/10/2021</a:t>
             </a:fld>
             <a:endParaRPr lang="en-GB"/>
           </a:p>
@@ -2194,7 +2195,7 @@
           <a:p>
             <a:fld id="{EADA9985-F9B8-4E11-8A40-B153142C5EE0}" type="datetimeFigureOut">
               <a:rPr lang="en-GB" smtClean="0"/>
-              <a:t>14/10/2021</a:t>
+              <a:t>19/10/2021</a:t>
             </a:fld>
             <a:endParaRPr lang="en-GB"/>
           </a:p>
@@ -2374,7 +2375,7 @@
           <a:p>
             <a:fld id="{EADA9985-F9B8-4E11-8A40-B153142C5EE0}" type="datetimeFigureOut">
               <a:rPr lang="en-GB" smtClean="0"/>
-              <a:t>14/10/2021</a:t>
+              <a:t>19/10/2021</a:t>
             </a:fld>
             <a:endParaRPr lang="en-GB"/>
           </a:p>
@@ -2544,7 +2545,7 @@
           <a:p>
             <a:fld id="{EADA9985-F9B8-4E11-8A40-B153142C5EE0}" type="datetimeFigureOut">
               <a:rPr lang="en-GB" smtClean="0"/>
-              <a:t>14/10/2021</a:t>
+              <a:t>19/10/2021</a:t>
             </a:fld>
             <a:endParaRPr lang="en-GB"/>
           </a:p>
@@ -2826,7 +2827,7 @@
           <a:p>
             <a:fld id="{EADA9985-F9B8-4E11-8A40-B153142C5EE0}" type="datetimeFigureOut">
               <a:rPr lang="en-GB" smtClean="0"/>
-              <a:t>14/10/2021</a:t>
+              <a:t>19/10/2021</a:t>
             </a:fld>
             <a:endParaRPr lang="en-GB"/>
           </a:p>
@@ -3058,7 +3059,7 @@
           <a:p>
             <a:fld id="{EADA9985-F9B8-4E11-8A40-B153142C5EE0}" type="datetimeFigureOut">
               <a:rPr lang="en-GB" smtClean="0"/>
-              <a:t>14/10/2021</a:t>
+              <a:t>19/10/2021</a:t>
             </a:fld>
             <a:endParaRPr lang="en-GB"/>
           </a:p>
@@ -3425,7 +3426,7 @@
           <a:p>
             <a:fld id="{EADA9985-F9B8-4E11-8A40-B153142C5EE0}" type="datetimeFigureOut">
               <a:rPr lang="en-GB" smtClean="0"/>
-              <a:t>14/10/2021</a:t>
+              <a:t>19/10/2021</a:t>
             </a:fld>
             <a:endParaRPr lang="en-GB"/>
           </a:p>
@@ -3543,7 +3544,7 @@
           <a:p>
             <a:fld id="{EADA9985-F9B8-4E11-8A40-B153142C5EE0}" type="datetimeFigureOut">
               <a:rPr lang="en-GB" smtClean="0"/>
-              <a:t>14/10/2021</a:t>
+              <a:t>19/10/2021</a:t>
             </a:fld>
             <a:endParaRPr lang="en-GB"/>
           </a:p>
@@ -3638,7 +3639,7 @@
           <a:p>
             <a:fld id="{EADA9985-F9B8-4E11-8A40-B153142C5EE0}" type="datetimeFigureOut">
               <a:rPr lang="en-GB" smtClean="0"/>
-              <a:t>14/10/2021</a:t>
+              <a:t>19/10/2021</a:t>
             </a:fld>
             <a:endParaRPr lang="en-GB"/>
           </a:p>
@@ -3915,7 +3916,7 @@
           <a:p>
             <a:fld id="{EADA9985-F9B8-4E11-8A40-B153142C5EE0}" type="datetimeFigureOut">
               <a:rPr lang="en-GB" smtClean="0"/>
-              <a:t>14/10/2021</a:t>
+              <a:t>19/10/2021</a:t>
             </a:fld>
             <a:endParaRPr lang="en-GB"/>
           </a:p>
@@ -4168,7 +4169,7 @@
           <a:p>
             <a:fld id="{EADA9985-F9B8-4E11-8A40-B153142C5EE0}" type="datetimeFigureOut">
               <a:rPr lang="en-GB" smtClean="0"/>
-              <a:t>14/10/2021</a:t>
+              <a:t>19/10/2021</a:t>
             </a:fld>
             <a:endParaRPr lang="en-GB"/>
           </a:p>
@@ -4381,7 +4382,7 @@
           <a:p>
             <a:fld id="{EADA9985-F9B8-4E11-8A40-B153142C5EE0}" type="datetimeFigureOut">
               <a:rPr lang="en-GB" smtClean="0"/>
-              <a:t>14/10/2021</a:t>
+              <a:t>19/10/2021</a:t>
             </a:fld>
             <a:endParaRPr lang="en-GB"/>
           </a:p>
@@ -5358,11 +5359,7 @@
           <a:lstStyle/>
           <a:p>
             <a:r>
-              <a:rPr lang="en-US" b="1" dirty="0">
-                <a:highlight>
-                  <a:srgbClr val="FFFF00"/>
-                </a:highlight>
-              </a:rPr>
+              <a:rPr lang="en-US" b="1" dirty="0"/>
               <a:t>Ride Response</a:t>
             </a:r>
           </a:p>
@@ -5648,6 +5645,416 @@
             <a:r>
               <a:rPr lang="en-US" dirty="0"/>
               <a:t>Output: suspension response</a:t>
+            </a:r>
+          </a:p>
+        </p:txBody>
+      </p:sp>
+      <p:sp>
+        <p:nvSpPr>
+          <p:cNvPr id="3" name="Oval 2">
+            <a:extLst>
+              <a:ext uri="{FF2B5EF4-FFF2-40B4-BE49-F238E27FC236}">
+                <a16:creationId xmlns:a16="http://schemas.microsoft.com/office/drawing/2014/main" id="{BD99F6C9-762F-0547-AE82-DCC6EC58922B}"/>
+              </a:ext>
+            </a:extLst>
+          </p:cNvPr>
+          <p:cNvSpPr/>
+          <p:nvPr/>
+        </p:nvSpPr>
+        <p:spPr>
+          <a:xfrm>
+            <a:off x="5643154" y="2508069"/>
+            <a:ext cx="827315" cy="618308"/>
+          </a:xfrm>
+          <a:prstGeom prst="ellipse">
+            <a:avLst/>
+          </a:prstGeom>
+          <a:noFill/>
+          <a:ln w="38100">
+            <a:solidFill>
+              <a:schemeClr val="accent6"/>
+            </a:solidFill>
+          </a:ln>
+        </p:spPr>
+        <p:style>
+          <a:lnRef idx="2">
+            <a:schemeClr val="accent1">
+              <a:shade val="50000"/>
+            </a:schemeClr>
+          </a:lnRef>
+          <a:fillRef idx="1">
+            <a:schemeClr val="accent1"/>
+          </a:fillRef>
+          <a:effectRef idx="0">
+            <a:schemeClr val="accent1"/>
+          </a:effectRef>
+          <a:fontRef idx="minor">
+            <a:schemeClr val="lt1"/>
+          </a:fontRef>
+        </p:style>
+        <p:txBody>
+          <a:bodyPr rtlCol="0" anchor="ctr"/>
+          <a:lstStyle/>
+          <a:p>
+            <a:pPr algn="ctr"/>
+            <a:endParaRPr lang="en-GB" dirty="0"/>
+          </a:p>
+        </p:txBody>
+      </p:sp>
+      <p:sp>
+        <p:nvSpPr>
+          <p:cNvPr id="12" name="Oval 11">
+            <a:extLst>
+              <a:ext uri="{FF2B5EF4-FFF2-40B4-BE49-F238E27FC236}">
+                <a16:creationId xmlns:a16="http://schemas.microsoft.com/office/drawing/2014/main" id="{436AAEFD-9341-4842-BF0B-DB0D8DA28DC4}"/>
+              </a:ext>
+            </a:extLst>
+          </p:cNvPr>
+          <p:cNvSpPr/>
+          <p:nvPr/>
+        </p:nvSpPr>
+        <p:spPr>
+          <a:xfrm>
+            <a:off x="6136254" y="3647293"/>
+            <a:ext cx="827315" cy="618308"/>
+          </a:xfrm>
+          <a:prstGeom prst="ellipse">
+            <a:avLst/>
+          </a:prstGeom>
+          <a:noFill/>
+          <a:ln w="38100">
+            <a:solidFill>
+              <a:schemeClr val="accent6"/>
+            </a:solidFill>
+          </a:ln>
+        </p:spPr>
+        <p:style>
+          <a:lnRef idx="2">
+            <a:schemeClr val="accent1">
+              <a:shade val="50000"/>
+            </a:schemeClr>
+          </a:lnRef>
+          <a:fillRef idx="1">
+            <a:schemeClr val="accent1"/>
+          </a:fillRef>
+          <a:effectRef idx="0">
+            <a:schemeClr val="accent1"/>
+          </a:effectRef>
+          <a:fontRef idx="minor">
+            <a:schemeClr val="lt1"/>
+          </a:fontRef>
+        </p:style>
+        <p:txBody>
+          <a:bodyPr rtlCol="0" anchor="ctr"/>
+          <a:lstStyle/>
+          <a:p>
+            <a:pPr algn="ctr"/>
+            <a:endParaRPr lang="en-GB" dirty="0"/>
+          </a:p>
+        </p:txBody>
+      </p:sp>
+      <p:sp>
+        <p:nvSpPr>
+          <p:cNvPr id="13" name="TextBox 12">
+            <a:extLst>
+              <a:ext uri="{FF2B5EF4-FFF2-40B4-BE49-F238E27FC236}">
+                <a16:creationId xmlns:a16="http://schemas.microsoft.com/office/drawing/2014/main" id="{E170B683-85F4-E447-82B6-23A1230E8F89}"/>
+              </a:ext>
+            </a:extLst>
+          </p:cNvPr>
+          <p:cNvSpPr txBox="1"/>
+          <p:nvPr/>
+        </p:nvSpPr>
+        <p:spPr>
+          <a:xfrm>
+            <a:off x="7410997" y="2299658"/>
+            <a:ext cx="1410964" cy="369332"/>
+          </a:xfrm>
+          <a:prstGeom prst="rect">
+            <a:avLst/>
+          </a:prstGeom>
+          <a:noFill/>
+        </p:spPr>
+        <p:txBody>
+          <a:bodyPr wrap="none" rtlCol="0">
+            <a:spAutoFit/>
+          </a:bodyPr>
+          <a:lstStyle/>
+          <a:p>
+            <a:r>
+              <a:rPr lang="en-GB" dirty="0"/>
+              <a:t>Body bounce</a:t>
+            </a:r>
+          </a:p>
+        </p:txBody>
+      </p:sp>
+      <p:sp>
+        <p:nvSpPr>
+          <p:cNvPr id="14" name="TextBox 13">
+            <a:extLst>
+              <a:ext uri="{FF2B5EF4-FFF2-40B4-BE49-F238E27FC236}">
+                <a16:creationId xmlns:a16="http://schemas.microsoft.com/office/drawing/2014/main" id="{1CFBD4BE-29B6-5042-9D5C-209B6FB05F30}"/>
+              </a:ext>
+            </a:extLst>
+          </p:cNvPr>
+          <p:cNvSpPr txBox="1"/>
+          <p:nvPr/>
+        </p:nvSpPr>
+        <p:spPr>
+          <a:xfrm>
+            <a:off x="7570101" y="4752927"/>
+            <a:ext cx="1213794" cy="369332"/>
+          </a:xfrm>
+          <a:prstGeom prst="rect">
+            <a:avLst/>
+          </a:prstGeom>
+          <a:noFill/>
+        </p:spPr>
+        <p:txBody>
+          <a:bodyPr wrap="none" rtlCol="0">
+            <a:spAutoFit/>
+          </a:bodyPr>
+          <a:lstStyle/>
+          <a:p>
+            <a:r>
+              <a:rPr lang="en-GB" dirty="0"/>
+              <a:t>Wheel hop</a:t>
+            </a:r>
+          </a:p>
+        </p:txBody>
+      </p:sp>
+      <p:cxnSp>
+        <p:nvCxnSpPr>
+          <p:cNvPr id="16" name="Straight Arrow Connector 15">
+            <a:extLst>
+              <a:ext uri="{FF2B5EF4-FFF2-40B4-BE49-F238E27FC236}">
+                <a16:creationId xmlns:a16="http://schemas.microsoft.com/office/drawing/2014/main" id="{2FB9081A-20D9-9F4F-A58A-F8C77D3EA4E9}"/>
+              </a:ext>
+            </a:extLst>
+          </p:cNvPr>
+          <p:cNvCxnSpPr>
+            <a:endCxn id="12" idx="5"/>
+          </p:cNvCxnSpPr>
+          <p:nvPr/>
+        </p:nvCxnSpPr>
+        <p:spPr>
+          <a:xfrm flipH="1" flipV="1">
+            <a:off x="6842412" y="4175052"/>
+            <a:ext cx="680390" cy="553065"/>
+          </a:xfrm>
+          <a:prstGeom prst="straightConnector1">
+            <a:avLst/>
+          </a:prstGeom>
+          <a:ln w="38100">
+            <a:solidFill>
+              <a:schemeClr val="accent6"/>
+            </a:solidFill>
+            <a:tailEnd type="triangle" w="lg" len="lg"/>
+          </a:ln>
+        </p:spPr>
+        <p:style>
+          <a:lnRef idx="1">
+            <a:schemeClr val="accent1"/>
+          </a:lnRef>
+          <a:fillRef idx="0">
+            <a:schemeClr val="accent1"/>
+          </a:fillRef>
+          <a:effectRef idx="0">
+            <a:schemeClr val="accent1"/>
+          </a:effectRef>
+          <a:fontRef idx="minor">
+            <a:schemeClr val="tx1"/>
+          </a:fontRef>
+        </p:style>
+      </p:cxnSp>
+      <p:cxnSp>
+        <p:nvCxnSpPr>
+          <p:cNvPr id="17" name="Straight Arrow Connector 16">
+            <a:extLst>
+              <a:ext uri="{FF2B5EF4-FFF2-40B4-BE49-F238E27FC236}">
+                <a16:creationId xmlns:a16="http://schemas.microsoft.com/office/drawing/2014/main" id="{AF2E1E56-3302-264C-9355-1B9B684E63CA}"/>
+              </a:ext>
+            </a:extLst>
+          </p:cNvPr>
+          <p:cNvCxnSpPr>
+            <a:cxnSpLocks/>
+            <a:stCxn id="13" idx="1"/>
+          </p:cNvCxnSpPr>
+          <p:nvPr/>
+        </p:nvCxnSpPr>
+        <p:spPr>
+          <a:xfrm flipH="1">
+            <a:off x="6431107" y="2484324"/>
+            <a:ext cx="979890" cy="184667"/>
+          </a:xfrm>
+          <a:prstGeom prst="straightConnector1">
+            <a:avLst/>
+          </a:prstGeom>
+          <a:ln w="38100">
+            <a:solidFill>
+              <a:schemeClr val="accent6"/>
+            </a:solidFill>
+            <a:tailEnd type="triangle" w="lg" len="lg"/>
+          </a:ln>
+        </p:spPr>
+        <p:style>
+          <a:lnRef idx="1">
+            <a:schemeClr val="accent1"/>
+          </a:lnRef>
+          <a:fillRef idx="0">
+            <a:schemeClr val="accent1"/>
+          </a:fillRef>
+          <a:effectRef idx="0">
+            <a:schemeClr val="accent1"/>
+          </a:effectRef>
+          <a:fontRef idx="minor">
+            <a:schemeClr val="tx1"/>
+          </a:fontRef>
+        </p:style>
+      </p:cxnSp>
+      <p:sp>
+        <p:nvSpPr>
+          <p:cNvPr id="19" name="Rectangle 18">
+            <a:extLst>
+              <a:ext uri="{FF2B5EF4-FFF2-40B4-BE49-F238E27FC236}">
+                <a16:creationId xmlns:a16="http://schemas.microsoft.com/office/drawing/2014/main" id="{2F5C2D10-5C20-ED42-9280-3179005DF0DE}"/>
+              </a:ext>
+            </a:extLst>
+          </p:cNvPr>
+          <p:cNvSpPr/>
+          <p:nvPr/>
+        </p:nvSpPr>
+        <p:spPr>
+          <a:xfrm>
+            <a:off x="10660566" y="3273205"/>
+            <a:ext cx="1070517" cy="2140837"/>
+          </a:xfrm>
+          <a:prstGeom prst="rect">
+            <a:avLst/>
+          </a:prstGeom>
+          <a:noFill/>
+          <a:ln w="38100">
+            <a:solidFill>
+              <a:schemeClr val="accent6"/>
+            </a:solidFill>
+          </a:ln>
+        </p:spPr>
+        <p:style>
+          <a:lnRef idx="2">
+            <a:schemeClr val="accent1">
+              <a:shade val="50000"/>
+            </a:schemeClr>
+          </a:lnRef>
+          <a:fillRef idx="1">
+            <a:schemeClr val="accent1"/>
+          </a:fillRef>
+          <a:effectRef idx="0">
+            <a:schemeClr val="accent1"/>
+          </a:effectRef>
+          <a:fontRef idx="minor">
+            <a:schemeClr val="lt1"/>
+          </a:fontRef>
+        </p:style>
+        <p:txBody>
+          <a:bodyPr rtlCol="0" anchor="ctr"/>
+          <a:lstStyle/>
+          <a:p>
+            <a:pPr algn="ctr"/>
+            <a:endParaRPr lang="en-GB"/>
+          </a:p>
+        </p:txBody>
+      </p:sp>
+      <p:sp>
+        <p:nvSpPr>
+          <p:cNvPr id="20" name="Rectangle 19">
+            <a:extLst>
+              <a:ext uri="{FF2B5EF4-FFF2-40B4-BE49-F238E27FC236}">
+                <a16:creationId xmlns:a16="http://schemas.microsoft.com/office/drawing/2014/main" id="{CBD3DE7F-F4E3-2F46-AE20-B27D5EBC8BEB}"/>
+              </a:ext>
+            </a:extLst>
+          </p:cNvPr>
+          <p:cNvSpPr/>
+          <p:nvPr/>
+        </p:nvSpPr>
+        <p:spPr>
+          <a:xfrm>
+            <a:off x="2000592" y="2651951"/>
+            <a:ext cx="1070517" cy="2140837"/>
+          </a:xfrm>
+          <a:prstGeom prst="rect">
+            <a:avLst/>
+          </a:prstGeom>
+          <a:noFill/>
+          <a:ln w="38100">
+            <a:solidFill>
+              <a:schemeClr val="accent6"/>
+            </a:solidFill>
+          </a:ln>
+        </p:spPr>
+        <p:style>
+          <a:lnRef idx="2">
+            <a:schemeClr val="accent1">
+              <a:shade val="50000"/>
+            </a:schemeClr>
+          </a:lnRef>
+          <a:fillRef idx="1">
+            <a:schemeClr val="accent1"/>
+          </a:fillRef>
+          <a:effectRef idx="0">
+            <a:schemeClr val="accent1"/>
+          </a:effectRef>
+          <a:fontRef idx="minor">
+            <a:schemeClr val="lt1"/>
+          </a:fontRef>
+        </p:style>
+        <p:txBody>
+          <a:bodyPr rtlCol="0" anchor="ctr"/>
+          <a:lstStyle/>
+          <a:p>
+            <a:pPr algn="ctr"/>
+            <a:endParaRPr lang="en-GB"/>
+          </a:p>
+        </p:txBody>
+      </p:sp>
+      <p:sp>
+        <p:nvSpPr>
+          <p:cNvPr id="21" name="TextBox 20">
+            <a:extLst>
+              <a:ext uri="{FF2B5EF4-FFF2-40B4-BE49-F238E27FC236}">
+                <a16:creationId xmlns:a16="http://schemas.microsoft.com/office/drawing/2014/main" id="{E829B9AB-60D5-954A-B6A3-7AF02A252F7A}"/>
+              </a:ext>
+            </a:extLst>
+          </p:cNvPr>
+          <p:cNvSpPr txBox="1"/>
+          <p:nvPr/>
+        </p:nvSpPr>
+        <p:spPr>
+          <a:xfrm>
+            <a:off x="10358217" y="5410338"/>
+            <a:ext cx="1611531" cy="646331"/>
+          </a:xfrm>
+          <a:prstGeom prst="rect">
+            <a:avLst/>
+          </a:prstGeom>
+          <a:noFill/>
+        </p:spPr>
+        <p:txBody>
+          <a:bodyPr wrap="none" rtlCol="0">
+            <a:spAutoFit/>
+          </a:bodyPr>
+          <a:lstStyle/>
+          <a:p>
+            <a:pPr algn="ctr"/>
+            <a:r>
+              <a:rPr lang="en-GB" dirty="0"/>
+              <a:t>High frequency</a:t>
+            </a:r>
+          </a:p>
+          <a:p>
+            <a:pPr algn="ctr"/>
+            <a:r>
+              <a:rPr lang="en-GB" dirty="0"/>
+              <a:t>attenuation</a:t>
             </a:r>
           </a:p>
         </p:txBody>
@@ -6115,8 +6522,8 @@
           </a:p>
         </p:txBody>
       </p:sp>
-      <mc:AlternateContent xmlns:mc="http://schemas.openxmlformats.org/markup-compatibility/2006">
-        <mc:Choice xmlns:a14="http://schemas.microsoft.com/office/drawing/2010/main" Requires="a14">
+      <mc:AlternateContent xmlns:mc="http://schemas.openxmlformats.org/markup-compatibility/2006" xmlns:a14="http://schemas.microsoft.com/office/drawing/2010/main">
+        <mc:Choice Requires="a14">
           <p:sp>
             <p:nvSpPr>
               <p:cNvPr id="7" name="TextBox 6">
@@ -6219,7 +6626,7 @@
             </p:txBody>
           </p:sp>
         </mc:Choice>
-        <mc:Fallback>
+        <mc:Fallback xmlns="">
           <p:sp>
             <p:nvSpPr>
               <p:cNvPr id="7" name="TextBox 6">
@@ -6322,7 +6729,7 @@
             <p:spPr>
               <a:xfrm>
                 <a:off x="8943394" y="3315648"/>
-                <a:ext cx="1950998" cy="1477328"/>
+                <a:ext cx="1950998" cy="1200329"/>
               </a:xfrm>
               <a:prstGeom prst="rect">
                 <a:avLst/>
@@ -6336,9 +6743,9 @@
               <a:lstStyle/>
               <a:p>
                 <a:r>
-                  <a:rPr lang="en-GB" b="1" dirty="0">
+                  <a:rPr lang="en-GB" dirty="0">
                     <a:solidFill>
-                      <a:schemeClr val="accent5"/>
+                      <a:schemeClr val="tx1"/>
                     </a:solidFill>
                   </a:rPr>
                   <a:t>Note lower amplitude as </a:t>
@@ -6350,9 +6757,9 @@
                     <m:sSub>
                       <m:sSubPr>
                         <m:ctrlPr>
-                          <a:rPr lang="en-GB" b="1" i="1" smtClean="0">
+                          <a:rPr lang="en-GB" i="1" smtClean="0">
                             <a:solidFill>
-                              <a:schemeClr val="accent5"/>
+                              <a:schemeClr val="tx1"/>
                             </a:solidFill>
                             <a:latin typeface="Cambria Math" panose="02040503050406030204" pitchFamily="18" charset="0"/>
                           </a:rPr>
@@ -6360,86 +6767,78 @@
                       </m:sSubPr>
                       <m:e>
                         <m:r>
-                          <a:rPr lang="en-GB" b="1" i="1" smtClean="0">
+                          <a:rPr lang="en-GB" b="0" i="1" smtClean="0">
                             <a:solidFill>
-                              <a:schemeClr val="accent5"/>
+                              <a:schemeClr val="tx1"/>
                             </a:solidFill>
                             <a:latin typeface="Cambria Math" panose="02040503050406030204" pitchFamily="18" charset="0"/>
                           </a:rPr>
-                          <m:t>𝝎</m:t>
+                          <m:t>𝜔</m:t>
                         </m:r>
                       </m:e>
                       <m:sub>
                         <m:r>
-                          <a:rPr lang="en-GB" b="1" i="1" smtClean="0">
+                          <a:rPr lang="en-GB" b="0" i="1" smtClean="0">
                             <a:solidFill>
-                              <a:schemeClr val="accent5"/>
+                              <a:schemeClr val="tx1"/>
                             </a:solidFill>
                             <a:latin typeface="Cambria Math" panose="02040503050406030204" pitchFamily="18" charset="0"/>
                           </a:rPr>
-                          <m:t>𝒏</m:t>
+                          <m:t>𝑛</m:t>
                         </m:r>
                       </m:sub>
                     </m:sSub>
                   </m:oMath>
                 </a14:m>
                 <a:r>
-                  <a:rPr lang="en-GB" b="1" dirty="0">
+                  <a:rPr lang="en-GB" dirty="0">
                     <a:solidFill>
-                      <a:schemeClr val="accent5"/>
+                      <a:schemeClr val="tx1"/>
                     </a:solidFill>
                   </a:rPr>
                   <a:t>is tuned down through </a:t>
                 </a:r>
-              </a:p>
-              <a:p>
-                <a:pPr/>
                 <a14:m>
-                  <m:oMathPara xmlns:m="http://schemas.openxmlformats.org/officeDocument/2006/math">
-                    <m:oMathParaPr>
-                      <m:jc m:val="centerGroup"/>
-                    </m:oMathParaPr>
-                    <m:oMath xmlns:m="http://schemas.openxmlformats.org/officeDocument/2006/math">
-                      <m:sSub>
-                        <m:sSubPr>
-                          <m:ctrlPr>
-                            <a:rPr lang="en-GB" b="1" i="1" smtClean="0">
-                              <a:solidFill>
-                                <a:schemeClr val="accent5"/>
-                              </a:solidFill>
-                              <a:latin typeface="Cambria Math" panose="02040503050406030204" pitchFamily="18" charset="0"/>
-                            </a:rPr>
-                          </m:ctrlPr>
-                        </m:sSubPr>
-                        <m:e>
-                          <m:r>
-                            <a:rPr lang="en-GB" b="1" i="1" smtClean="0">
-                              <a:solidFill>
-                                <a:schemeClr val="accent5"/>
-                              </a:solidFill>
-                              <a:latin typeface="Cambria Math" panose="02040503050406030204" pitchFamily="18" charset="0"/>
-                            </a:rPr>
-                            <m:t>𝑲</m:t>
-                          </m:r>
-                        </m:e>
-                        <m:sub>
-                          <m:r>
-                            <a:rPr lang="en-GB" b="1" i="1" smtClean="0">
-                              <a:solidFill>
-                                <a:schemeClr val="accent5"/>
-                              </a:solidFill>
-                              <a:latin typeface="Cambria Math" panose="02040503050406030204" pitchFamily="18" charset="0"/>
-                            </a:rPr>
-                            <m:t>𝒔</m:t>
-                          </m:r>
-                        </m:sub>
-                      </m:sSub>
-                    </m:oMath>
-                  </m:oMathPara>
+                  <m:oMath xmlns:m="http://schemas.openxmlformats.org/officeDocument/2006/math">
+                    <m:sSub>
+                      <m:sSubPr>
+                        <m:ctrlPr>
+                          <a:rPr lang="en-GB" i="1" smtClean="0">
+                            <a:solidFill>
+                              <a:schemeClr val="tx1"/>
+                            </a:solidFill>
+                            <a:latin typeface="Cambria Math" panose="02040503050406030204" pitchFamily="18" charset="0"/>
+                          </a:rPr>
+                        </m:ctrlPr>
+                      </m:sSubPr>
+                      <m:e>
+                        <m:r>
+                          <a:rPr lang="en-GB" b="0" i="1" smtClean="0">
+                            <a:solidFill>
+                              <a:schemeClr val="tx1"/>
+                            </a:solidFill>
+                            <a:latin typeface="Cambria Math" panose="02040503050406030204" pitchFamily="18" charset="0"/>
+                          </a:rPr>
+                          <m:t>𝐾</m:t>
+                        </m:r>
+                      </m:e>
+                      <m:sub>
+                        <m:r>
+                          <a:rPr lang="en-GB" b="0" i="1" smtClean="0">
+                            <a:solidFill>
+                              <a:schemeClr val="tx1"/>
+                            </a:solidFill>
+                            <a:latin typeface="Cambria Math" panose="02040503050406030204" pitchFamily="18" charset="0"/>
+                          </a:rPr>
+                          <m:t>𝑠</m:t>
+                        </m:r>
+                      </m:sub>
+                    </m:sSub>
+                  </m:oMath>
                 </a14:m>
-                <a:endParaRPr lang="en-GB" b="1" dirty="0">
+                <a:endParaRPr lang="en-GB" dirty="0">
                   <a:solidFill>
-                    <a:schemeClr val="accent5"/>
+                    <a:schemeClr val="tx1"/>
                   </a:solidFill>
                 </a:endParaRPr>
               </a:p>
@@ -6464,7 +6863,7 @@
             <p:spPr>
               <a:xfrm>
                 <a:off x="8943394" y="3315648"/>
-                <a:ext cx="1950998" cy="1477328"/>
+                <a:ext cx="1950998" cy="1200329"/>
               </a:xfrm>
               <a:prstGeom prst="rect">
                 <a:avLst/>
@@ -6472,7 +6871,7 @@
               <a:blipFill>
                 <a:blip r:embed="rId8"/>
                 <a:stretch>
-                  <a:fillRect l="-2597" t="-2564"/>
+                  <a:fillRect l="-2597" t="-3158" b="-7368"/>
                 </a:stretch>
               </a:blipFill>
             </p:spPr>
@@ -6626,6 +7025,145 @@
           </a:prstGeom>
         </p:spPr>
       </p:pic>
+      <p:sp>
+        <p:nvSpPr>
+          <p:cNvPr id="6" name="Oval 5">
+            <a:extLst>
+              <a:ext uri="{FF2B5EF4-FFF2-40B4-BE49-F238E27FC236}">
+                <a16:creationId xmlns:a16="http://schemas.microsoft.com/office/drawing/2014/main" id="{16D8F58E-8DA3-6B44-87D8-4B0781D86C48}"/>
+              </a:ext>
+            </a:extLst>
+          </p:cNvPr>
+          <p:cNvSpPr/>
+          <p:nvPr/>
+        </p:nvSpPr>
+        <p:spPr>
+          <a:xfrm>
+            <a:off x="7081662" y="3199444"/>
+            <a:ext cx="827315" cy="618308"/>
+          </a:xfrm>
+          <a:prstGeom prst="ellipse">
+            <a:avLst/>
+          </a:prstGeom>
+          <a:noFill/>
+          <a:ln w="38100">
+            <a:solidFill>
+              <a:schemeClr val="accent6"/>
+            </a:solidFill>
+          </a:ln>
+        </p:spPr>
+        <p:style>
+          <a:lnRef idx="2">
+            <a:schemeClr val="accent1">
+              <a:shade val="50000"/>
+            </a:schemeClr>
+          </a:lnRef>
+          <a:fillRef idx="1">
+            <a:schemeClr val="accent1"/>
+          </a:fillRef>
+          <a:effectRef idx="0">
+            <a:schemeClr val="accent1"/>
+          </a:effectRef>
+          <a:fontRef idx="minor">
+            <a:schemeClr val="lt1"/>
+          </a:fontRef>
+        </p:style>
+        <p:txBody>
+          <a:bodyPr rtlCol="0" anchor="ctr"/>
+          <a:lstStyle/>
+          <a:p>
+            <a:pPr algn="ctr"/>
+            <a:endParaRPr lang="en-GB" dirty="0"/>
+          </a:p>
+        </p:txBody>
+      </p:sp>
+      <p:cxnSp>
+        <p:nvCxnSpPr>
+          <p:cNvPr id="7" name="Straight Arrow Connector 6">
+            <a:extLst>
+              <a:ext uri="{FF2B5EF4-FFF2-40B4-BE49-F238E27FC236}">
+                <a16:creationId xmlns:a16="http://schemas.microsoft.com/office/drawing/2014/main" id="{0A5B0F4D-0167-E24F-8D76-384D3D3865A3}"/>
+              </a:ext>
+            </a:extLst>
+          </p:cNvPr>
+          <p:cNvCxnSpPr>
+            <a:cxnSpLocks/>
+          </p:cNvCxnSpPr>
+          <p:nvPr/>
+        </p:nvCxnSpPr>
+        <p:spPr>
+          <a:xfrm flipV="1">
+            <a:off x="6958361" y="3817752"/>
+            <a:ext cx="345688" cy="1166843"/>
+          </a:xfrm>
+          <a:prstGeom prst="straightConnector1">
+            <a:avLst/>
+          </a:prstGeom>
+          <a:ln w="38100">
+            <a:solidFill>
+              <a:schemeClr val="accent6"/>
+            </a:solidFill>
+            <a:tailEnd type="triangle" w="lg" len="lg"/>
+          </a:ln>
+        </p:spPr>
+        <p:style>
+          <a:lnRef idx="1">
+            <a:schemeClr val="accent1"/>
+          </a:lnRef>
+          <a:fillRef idx="0">
+            <a:schemeClr val="accent1"/>
+          </a:fillRef>
+          <a:effectRef idx="0">
+            <a:schemeClr val="accent1"/>
+          </a:effectRef>
+          <a:fontRef idx="minor">
+            <a:schemeClr val="tx1"/>
+          </a:fontRef>
+        </p:style>
+      </p:cxnSp>
+      <p:sp>
+        <p:nvSpPr>
+          <p:cNvPr id="10" name="TextBox 9">
+            <a:extLst>
+              <a:ext uri="{FF2B5EF4-FFF2-40B4-BE49-F238E27FC236}">
+                <a16:creationId xmlns:a16="http://schemas.microsoft.com/office/drawing/2014/main" id="{08B17D54-8D6E-D24A-84E4-568910DAAA00}"/>
+              </a:ext>
+            </a:extLst>
+          </p:cNvPr>
+          <p:cNvSpPr txBox="1"/>
+          <p:nvPr/>
+        </p:nvSpPr>
+        <p:spPr>
+          <a:xfrm>
+            <a:off x="5604411" y="5006897"/>
+            <a:ext cx="2540632" cy="646331"/>
+          </a:xfrm>
+          <a:prstGeom prst="rect">
+            <a:avLst/>
+          </a:prstGeom>
+          <a:noFill/>
+        </p:spPr>
+        <p:txBody>
+          <a:bodyPr wrap="none" rtlCol="0">
+            <a:spAutoFit/>
+          </a:bodyPr>
+          <a:lstStyle/>
+          <a:p>
+            <a:pPr algn="ctr"/>
+            <a:r>
+              <a:rPr lang="en-GB" dirty="0"/>
+              <a:t>Effectively ‘tied’ together</a:t>
+            </a:r>
+          </a:p>
+          <a:p>
+            <a:pPr algn="ctr"/>
+            <a:r>
+              <a:rPr lang="en-GB" dirty="0"/>
+              <a:t>body and wheel.</a:t>
+            </a:r>
+          </a:p>
+        </p:txBody>
+      </p:sp>
     </p:spTree>
     <p:extLst>
       <p:ext uri="{BB962C8B-B14F-4D97-AF65-F5344CB8AC3E}">
@@ -6777,6 +7315,139 @@
           </a:prstGeom>
         </p:spPr>
       </p:pic>
+      <p:sp>
+        <p:nvSpPr>
+          <p:cNvPr id="6" name="Oval 5">
+            <a:extLst>
+              <a:ext uri="{FF2B5EF4-FFF2-40B4-BE49-F238E27FC236}">
+                <a16:creationId xmlns:a16="http://schemas.microsoft.com/office/drawing/2014/main" id="{725C8A66-8A32-DC4F-8AB1-F448BC432E79}"/>
+              </a:ext>
+            </a:extLst>
+          </p:cNvPr>
+          <p:cNvSpPr/>
+          <p:nvPr/>
+        </p:nvSpPr>
+        <p:spPr>
+          <a:xfrm>
+            <a:off x="9444844" y="2117776"/>
+            <a:ext cx="827315" cy="618308"/>
+          </a:xfrm>
+          <a:prstGeom prst="ellipse">
+            <a:avLst/>
+          </a:prstGeom>
+          <a:noFill/>
+          <a:ln w="38100">
+            <a:solidFill>
+              <a:schemeClr val="accent6"/>
+            </a:solidFill>
+          </a:ln>
+        </p:spPr>
+        <p:style>
+          <a:lnRef idx="2">
+            <a:schemeClr val="accent1">
+              <a:shade val="50000"/>
+            </a:schemeClr>
+          </a:lnRef>
+          <a:fillRef idx="1">
+            <a:schemeClr val="accent1"/>
+          </a:fillRef>
+          <a:effectRef idx="0">
+            <a:schemeClr val="accent1"/>
+          </a:effectRef>
+          <a:fontRef idx="minor">
+            <a:schemeClr val="lt1"/>
+          </a:fontRef>
+        </p:style>
+        <p:txBody>
+          <a:bodyPr rtlCol="0" anchor="ctr"/>
+          <a:lstStyle/>
+          <a:p>
+            <a:pPr algn="ctr"/>
+            <a:endParaRPr lang="en-GB" dirty="0"/>
+          </a:p>
+        </p:txBody>
+      </p:sp>
+      <p:cxnSp>
+        <p:nvCxnSpPr>
+          <p:cNvPr id="7" name="Straight Arrow Connector 6">
+            <a:extLst>
+              <a:ext uri="{FF2B5EF4-FFF2-40B4-BE49-F238E27FC236}">
+                <a16:creationId xmlns:a16="http://schemas.microsoft.com/office/drawing/2014/main" id="{327687AD-1CD1-9341-B796-36D41E7A4DB8}"/>
+              </a:ext>
+            </a:extLst>
+          </p:cNvPr>
+          <p:cNvCxnSpPr>
+            <a:cxnSpLocks/>
+            <a:endCxn id="6" idx="1"/>
+          </p:cNvCxnSpPr>
+          <p:nvPr/>
+        </p:nvCxnSpPr>
+        <p:spPr>
+          <a:xfrm>
+            <a:off x="9021337" y="914400"/>
+            <a:ext cx="544664" cy="1293925"/>
+          </a:xfrm>
+          <a:prstGeom prst="straightConnector1">
+            <a:avLst/>
+          </a:prstGeom>
+          <a:ln w="38100">
+            <a:solidFill>
+              <a:schemeClr val="accent6"/>
+            </a:solidFill>
+            <a:tailEnd type="triangle" w="lg" len="lg"/>
+          </a:ln>
+        </p:spPr>
+        <p:style>
+          <a:lnRef idx="1">
+            <a:schemeClr val="accent1"/>
+          </a:lnRef>
+          <a:fillRef idx="0">
+            <a:schemeClr val="accent1"/>
+          </a:fillRef>
+          <a:effectRef idx="0">
+            <a:schemeClr val="accent1"/>
+          </a:effectRef>
+          <a:fontRef idx="minor">
+            <a:schemeClr val="tx1"/>
+          </a:fontRef>
+        </p:style>
+      </p:cxnSp>
+      <p:sp>
+        <p:nvSpPr>
+          <p:cNvPr id="10" name="TextBox 9">
+            <a:extLst>
+              <a:ext uri="{FF2B5EF4-FFF2-40B4-BE49-F238E27FC236}">
+                <a16:creationId xmlns:a16="http://schemas.microsoft.com/office/drawing/2014/main" id="{425F58F0-3ACD-0147-A4B6-9F060AA6AB53}"/>
+              </a:ext>
+            </a:extLst>
+          </p:cNvPr>
+          <p:cNvSpPr txBox="1"/>
+          <p:nvPr/>
+        </p:nvSpPr>
+        <p:spPr>
+          <a:xfrm>
+            <a:off x="7451195" y="496370"/>
+            <a:ext cx="3140283" cy="369332"/>
+          </a:xfrm>
+          <a:prstGeom prst="rect">
+            <a:avLst/>
+          </a:prstGeom>
+          <a:noFill/>
+        </p:spPr>
+        <p:txBody>
+          <a:bodyPr wrap="none" rtlCol="0">
+            <a:spAutoFit/>
+          </a:bodyPr>
+          <a:lstStyle/>
+          <a:p>
+            <a:pPr algn="ctr"/>
+            <a:r>
+              <a:rPr lang="en-GB" dirty="0"/>
+              <a:t>Less easy to manage wheel hop</a:t>
+            </a:r>
+          </a:p>
+        </p:txBody>
+      </p:sp>
     </p:spTree>
     <p:extLst>
       <p:ext uri="{BB962C8B-B14F-4D97-AF65-F5344CB8AC3E}">
@@ -7163,7 +7834,15 @@
           <a:p>
             <a:r>
               <a:rPr lang="en-GB" dirty="0"/>
-              <a:t>By making front ride rate lower at the front it is possible to reduce the discomfort of pitching.</a:t>
+              <a:t>By making </a:t>
+            </a:r>
+            <a:r>
+              <a:rPr lang="en-GB" u="sng" dirty="0"/>
+              <a:t>front ride rate lower </a:t>
+            </a:r>
+            <a:r>
+              <a:rPr lang="en-GB" dirty="0"/>
+              <a:t>at the front it is possible to reduce the discomfort of pitching.</a:t>
             </a:r>
           </a:p>
           <a:p>
@@ -7340,7 +8019,7 @@
         </p:blipFill>
         <p:spPr>
           <a:xfrm>
-            <a:off x="6096000" y="554615"/>
+            <a:off x="6096000" y="1003315"/>
             <a:ext cx="4888337" cy="5173648"/>
           </a:xfrm>
           <a:prstGeom prst="rect">
@@ -7348,6 +8027,41 @@
           </a:prstGeom>
         </p:spPr>
       </p:pic>
+      <p:sp>
+        <p:nvSpPr>
+          <p:cNvPr id="5" name="TextBox 4">
+            <a:extLst>
+              <a:ext uri="{FF2B5EF4-FFF2-40B4-BE49-F238E27FC236}">
+                <a16:creationId xmlns:a16="http://schemas.microsoft.com/office/drawing/2014/main" id="{D8E2E6D7-3995-6B44-BD72-75E15B407009}"/>
+              </a:ext>
+            </a:extLst>
+          </p:cNvPr>
+          <p:cNvSpPr txBox="1"/>
+          <p:nvPr/>
+        </p:nvSpPr>
+        <p:spPr>
+          <a:xfrm>
+            <a:off x="6835698" y="499554"/>
+            <a:ext cx="4048801" cy="369332"/>
+          </a:xfrm>
+          <a:prstGeom prst="rect">
+            <a:avLst/>
+          </a:prstGeom>
+          <a:noFill/>
+        </p:spPr>
+        <p:txBody>
+          <a:bodyPr wrap="none" rtlCol="0">
+            <a:spAutoFit/>
+          </a:bodyPr>
+          <a:lstStyle/>
+          <a:p>
+            <a:r>
+              <a:rPr lang="en-GB" dirty="0"/>
+              <a:t>Ride discomfort (lines of equal tolerance)</a:t>
+            </a:r>
+          </a:p>
+        </p:txBody>
+      </p:sp>
     </p:spTree>
     <p:extLst>
       <p:ext uri="{BB962C8B-B14F-4D97-AF65-F5344CB8AC3E}">
@@ -7391,7 +8105,7 @@
           <p:cNvPr id="2" name="Title 1">
             <a:extLst>
               <a:ext uri="{FF2B5EF4-FFF2-40B4-BE49-F238E27FC236}">
-                <a16:creationId xmlns:a16="http://schemas.microsoft.com/office/drawing/2014/main" id="{22D06D47-7C81-E345-96A9-9A2A74E991A4}"/>
+                <a16:creationId xmlns:a16="http://schemas.microsoft.com/office/drawing/2014/main" id="{2262C54D-11DF-D14E-A06A-EA7C05DBD23F}"/>
               </a:ext>
             </a:extLst>
           </p:cNvPr>
@@ -7409,8 +8123,9 @@
           <a:p>
             <a:r>
               <a:rPr lang="en-US" b="1" dirty="0"/>
-              <a:t>Conclusions</a:t>
-            </a:r>
+              <a:t>Human Perception</a:t>
+            </a:r>
+            <a:endParaRPr lang="en-GB" dirty="0"/>
           </a:p>
         </p:txBody>
       </p:sp>
@@ -7419,7 +8134,7 @@
           <p:cNvPr id="3" name="Content Placeholder 2">
             <a:extLst>
               <a:ext uri="{FF2B5EF4-FFF2-40B4-BE49-F238E27FC236}">
-                <a16:creationId xmlns:a16="http://schemas.microsoft.com/office/drawing/2014/main" id="{E49447FD-E76F-CC4B-98CD-050F6B495E8D}"/>
+                <a16:creationId xmlns:a16="http://schemas.microsoft.com/office/drawing/2014/main" id="{7AC4FC7C-3270-664A-A31D-C4EF97E6CBFC}"/>
               </a:ext>
             </a:extLst>
           </p:cNvPr>
@@ -7430,90 +8145,86 @@
             <p:ph idx="1"/>
           </p:nvPr>
         </p:nvSpPr>
-        <p:spPr/>
-        <p:txBody>
-          <a:bodyPr>
-            <a:normAutofit/>
-          </a:bodyPr>
-          <a:lstStyle/>
-          <a:p>
-            <a:pPr>
-              <a:lnSpc>
-                <a:spcPct val="120000"/>
-              </a:lnSpc>
-            </a:pPr>
-            <a:r>
-              <a:rPr lang="en-GB" sz="3200" dirty="0"/>
-              <a:t>Excitation input</a:t>
-            </a:r>
-          </a:p>
-          <a:p>
-            <a:pPr>
-              <a:lnSpc>
-                <a:spcPct val="120000"/>
-              </a:lnSpc>
-            </a:pPr>
-            <a:r>
-              <a:rPr lang="en-GB" sz="3200" dirty="0"/>
-              <a:t>Quarter car model</a:t>
-            </a:r>
-          </a:p>
-          <a:p>
-            <a:pPr>
-              <a:lnSpc>
-                <a:spcPct val="120000"/>
-              </a:lnSpc>
-            </a:pPr>
-            <a:r>
-              <a:rPr lang="en-GB" sz="3200" dirty="0"/>
-              <a:t>Ride response</a:t>
-            </a:r>
-          </a:p>
-          <a:p>
-            <a:pPr lvl="1">
-              <a:lnSpc>
-                <a:spcPct val="120000"/>
-              </a:lnSpc>
-            </a:pPr>
-            <a:r>
-              <a:rPr lang="en-GB" sz="2800" dirty="0"/>
-              <a:t>Active suspension</a:t>
-            </a:r>
-          </a:p>
-          <a:p>
-            <a:pPr>
-              <a:lnSpc>
-                <a:spcPct val="120000"/>
-              </a:lnSpc>
-            </a:pPr>
-            <a:r>
-              <a:rPr lang="en-GB" sz="3200" dirty="0"/>
-              <a:t>Human perception</a:t>
-            </a:r>
-          </a:p>
-          <a:p>
-            <a:endParaRPr lang="en-US" sz="3600" dirty="0"/>
-          </a:p>
-        </p:txBody>
-      </p:sp>
+        <p:spPr>
+          <a:xfrm>
+            <a:off x="838200" y="1825625"/>
+            <a:ext cx="2897459" cy="4351338"/>
+          </a:xfrm>
+        </p:spPr>
+        <p:txBody>
+          <a:bodyPr/>
+          <a:lstStyle/>
+          <a:p>
+            <a:r>
+              <a:rPr lang="en-GB" dirty="0"/>
+              <a:t>Fore-aft vibration lines of ‘equal comfort’</a:t>
+            </a:r>
+          </a:p>
+          <a:p>
+            <a:r>
+              <a:rPr lang="en-GB" dirty="0"/>
+              <a:t>Fore-aft tolerance no the same as vertical tolerance.</a:t>
+            </a:r>
+          </a:p>
+        </p:txBody>
+      </p:sp>
+      <p:pic>
+        <p:nvPicPr>
+          <p:cNvPr id="1026" name="Picture 2">
+            <a:extLst>
+              <a:ext uri="{FF2B5EF4-FFF2-40B4-BE49-F238E27FC236}">
+                <a16:creationId xmlns:a16="http://schemas.microsoft.com/office/drawing/2014/main" id="{956AF6A1-1D69-7C40-983C-C639C9266688}"/>
+              </a:ext>
+            </a:extLst>
+          </p:cNvPr>
+          <p:cNvPicPr>
+            <a:picLocks noChangeAspect="1" noChangeArrowheads="1"/>
+          </p:cNvPicPr>
+          <p:nvPr/>
+        </p:nvPicPr>
+        <p:blipFill>
+          <a:blip r:embed="rId2">
+            <a:extLst>
+              <a:ext uri="{28A0092B-C50C-407E-A947-70E740481C1C}">
+                <a14:useLocalDpi xmlns:a14="http://schemas.microsoft.com/office/drawing/2010/main" val="0"/>
+              </a:ext>
+            </a:extLst>
+          </a:blip>
+          <a:srcRect/>
+          <a:stretch>
+            <a:fillRect/>
+          </a:stretch>
+        </p:blipFill>
+        <p:spPr bwMode="auto">
+          <a:xfrm>
+            <a:off x="5430025" y="1115935"/>
+            <a:ext cx="5420112" cy="4867261"/>
+          </a:xfrm>
+          <a:prstGeom prst="rect">
+            <a:avLst/>
+          </a:prstGeom>
+          <a:noFill/>
+          <a:extLst>
+            <a:ext uri="{909E8E84-426E-40DD-AFC4-6F175D3DCCD1}">
+              <a14:hiddenFill xmlns:a14="http://schemas.microsoft.com/office/drawing/2010/main">
+                <a:solidFill>
+                  <a:srgbClr val="FFFFFF"/>
+                </a:solidFill>
+              </a14:hiddenFill>
+            </a:ext>
+          </a:extLst>
+        </p:spPr>
+      </p:pic>
     </p:spTree>
     <p:extLst>
       <p:ext uri="{BB962C8B-B14F-4D97-AF65-F5344CB8AC3E}">
-        <p14:creationId xmlns:p14="http://schemas.microsoft.com/office/powerpoint/2010/main" val="480198269"/>
+        <p14:creationId xmlns:p14="http://schemas.microsoft.com/office/powerpoint/2010/main" val="2066065452"/>
       </p:ext>
     </p:extLst>
   </p:cSld>
   <p:clrMapOvr>
     <a:masterClrMapping/>
   </p:clrMapOvr>
-  <mc:AlternateContent xmlns:mc="http://schemas.openxmlformats.org/markup-compatibility/2006" xmlns:p14="http://schemas.microsoft.com/office/powerpoint/2010/main">
-    <mc:Choice Requires="p14">
-      <p:transition spd="slow" p14:dur="2000" advTm="181463"/>
-    </mc:Choice>
-    <mc:Fallback xmlns="">
-      <p:transition spd="slow" advTm="181463"/>
-    </mc:Fallback>
-  </mc:AlternateContent>
 </p:sld>
 </file>
 
@@ -7712,6 +8423,154 @@
     </mc:Choice>
     <mc:Fallback xmlns="">
       <p:transition spd="slow" advTm="158287"/>
+    </mc:Fallback>
+  </mc:AlternateContent>
+</p:sld>
+</file>
+
+<file path=ppt/slides/slide20.xml><?xml version="1.0" encoding="utf-8"?>
+<p:sld xmlns:a="http://schemas.openxmlformats.org/drawingml/2006/main" xmlns:r="http://schemas.openxmlformats.org/officeDocument/2006/relationships" xmlns:p="http://schemas.openxmlformats.org/presentationml/2006/main">
+  <p:cSld>
+    <p:spTree>
+      <p:nvGrpSpPr>
+        <p:cNvPr id="1" name=""/>
+        <p:cNvGrpSpPr/>
+        <p:nvPr/>
+      </p:nvGrpSpPr>
+      <p:grpSpPr>
+        <a:xfrm>
+          <a:off x="0" y="0"/>
+          <a:ext cx="0" cy="0"/>
+          <a:chOff x="0" y="0"/>
+          <a:chExt cx="0" cy="0"/>
+        </a:xfrm>
+      </p:grpSpPr>
+      <p:sp>
+        <p:nvSpPr>
+          <p:cNvPr id="2" name="Title 1">
+            <a:extLst>
+              <a:ext uri="{FF2B5EF4-FFF2-40B4-BE49-F238E27FC236}">
+                <a16:creationId xmlns:a16="http://schemas.microsoft.com/office/drawing/2014/main" id="{22D06D47-7C81-E345-96A9-9A2A74E991A4}"/>
+              </a:ext>
+            </a:extLst>
+          </p:cNvPr>
+          <p:cNvSpPr>
+            <a:spLocks noGrp="1"/>
+          </p:cNvSpPr>
+          <p:nvPr>
+            <p:ph type="title"/>
+          </p:nvPr>
+        </p:nvSpPr>
+        <p:spPr/>
+        <p:txBody>
+          <a:bodyPr/>
+          <a:lstStyle/>
+          <a:p>
+            <a:r>
+              <a:rPr lang="en-US" b="1" dirty="0"/>
+              <a:t>Conclusions</a:t>
+            </a:r>
+          </a:p>
+        </p:txBody>
+      </p:sp>
+      <p:sp>
+        <p:nvSpPr>
+          <p:cNvPr id="3" name="Content Placeholder 2">
+            <a:extLst>
+              <a:ext uri="{FF2B5EF4-FFF2-40B4-BE49-F238E27FC236}">
+                <a16:creationId xmlns:a16="http://schemas.microsoft.com/office/drawing/2014/main" id="{E49447FD-E76F-CC4B-98CD-050F6B495E8D}"/>
+              </a:ext>
+            </a:extLst>
+          </p:cNvPr>
+          <p:cNvSpPr>
+            <a:spLocks noGrp="1"/>
+          </p:cNvSpPr>
+          <p:nvPr>
+            <p:ph idx="1"/>
+          </p:nvPr>
+        </p:nvSpPr>
+        <p:spPr/>
+        <p:txBody>
+          <a:bodyPr>
+            <a:normAutofit/>
+          </a:bodyPr>
+          <a:lstStyle/>
+          <a:p>
+            <a:pPr>
+              <a:lnSpc>
+                <a:spcPct val="120000"/>
+              </a:lnSpc>
+            </a:pPr>
+            <a:r>
+              <a:rPr lang="en-GB" sz="3200" dirty="0"/>
+              <a:t>Excitation input</a:t>
+            </a:r>
+          </a:p>
+          <a:p>
+            <a:pPr>
+              <a:lnSpc>
+                <a:spcPct val="120000"/>
+              </a:lnSpc>
+            </a:pPr>
+            <a:r>
+              <a:rPr lang="en-GB" sz="3200" dirty="0"/>
+              <a:t>Quarter car model</a:t>
+            </a:r>
+          </a:p>
+          <a:p>
+            <a:pPr>
+              <a:lnSpc>
+                <a:spcPct val="120000"/>
+              </a:lnSpc>
+            </a:pPr>
+            <a:r>
+              <a:rPr lang="en-GB" sz="3200" dirty="0"/>
+              <a:t>Ride response</a:t>
+            </a:r>
+          </a:p>
+          <a:p>
+            <a:pPr lvl="1">
+              <a:lnSpc>
+                <a:spcPct val="120000"/>
+              </a:lnSpc>
+            </a:pPr>
+            <a:r>
+              <a:rPr lang="en-GB" sz="2800" dirty="0"/>
+              <a:t>Active suspension</a:t>
+            </a:r>
+          </a:p>
+          <a:p>
+            <a:pPr>
+              <a:lnSpc>
+                <a:spcPct val="120000"/>
+              </a:lnSpc>
+            </a:pPr>
+            <a:r>
+              <a:rPr lang="en-GB" sz="3200" dirty="0"/>
+              <a:t>Human perception</a:t>
+            </a:r>
+          </a:p>
+          <a:p>
+            <a:endParaRPr lang="en-US" sz="3600" dirty="0"/>
+          </a:p>
+        </p:txBody>
+      </p:sp>
+    </p:spTree>
+    <p:extLst>
+      <p:ext uri="{BB962C8B-B14F-4D97-AF65-F5344CB8AC3E}">
+        <p14:creationId xmlns:p14="http://schemas.microsoft.com/office/powerpoint/2010/main" val="480198269"/>
+      </p:ext>
+    </p:extLst>
+  </p:cSld>
+  <p:clrMapOvr>
+    <a:masterClrMapping/>
+  </p:clrMapOvr>
+  <mc:AlternateContent xmlns:mc="http://schemas.openxmlformats.org/markup-compatibility/2006" xmlns:p14="http://schemas.microsoft.com/office/powerpoint/2010/main">
+    <mc:Choice Requires="p14">
+      <p:transition spd="slow" p14:dur="2000" advTm="181463"/>
+    </mc:Choice>
+    <mc:Fallback xmlns="">
+      <p:transition spd="slow" advTm="181463"/>
     </mc:Fallback>
   </mc:AlternateContent>
 </p:sld>

</xml_diff>

<commit_message>
Minor updates to lecture slides
</commit_message>
<xml_diff>
--- a/docs/lectures/Ride Dynamics.pptx
+++ b/docs/lectures/Ride Dynamics.pptx
@@ -965,7 +965,7 @@
           <a:p>
             <a:fld id="{6AD24EC9-7198-4B56-AEF9-BBEDF5640E20}" type="datetimeFigureOut">
               <a:rPr lang="en-GB" smtClean="0"/>
-              <a:t>18/10/2022</a:t>
+              <a:t>17/10/2023</a:t>
             </a:fld>
             <a:endParaRPr lang="en-GB"/>
           </a:p>
@@ -1130,7 +1130,7 @@
           <a:p>
             <a:fld id="{9DA14B43-C65A-4AE6-9D2C-F5DDC46BD098}" type="datetimeFigureOut">
               <a:rPr lang="en-GB" smtClean="0"/>
-              <a:t>18/10/2022</a:t>
+              <a:t>17/10/2023</a:t>
             </a:fld>
             <a:endParaRPr lang="en-GB"/>
           </a:p>
@@ -1615,7 +1615,30 @@
           <a:bodyPr/>
           <a:lstStyle/>
           <a:p>
-            <a:endParaRPr lang="en-GB" dirty="0"/>
+            <a:r>
+              <a:rPr lang="en-GB" dirty="0" err="1"/>
+              <a:t>K_t</a:t>
+            </a:r>
+            <a:r>
+              <a:rPr lang="en-GB" dirty="0"/>
+              <a:t> is much stiffer than </a:t>
+            </a:r>
+            <a:r>
+              <a:rPr lang="en-GB" dirty="0" err="1"/>
+              <a:t>k_s</a:t>
+            </a:r>
+            <a:r>
+              <a:rPr lang="en-GB" dirty="0"/>
+              <a:t> so </a:t>
+            </a:r>
+            <a:r>
+              <a:rPr lang="en-GB" dirty="0" err="1"/>
+              <a:t>k_s</a:t>
+            </a:r>
+            <a:r>
+              <a:rPr lang="en-GB" dirty="0"/>
+              <a:t> dominates.</a:t>
+            </a:r>
           </a:p>
         </p:txBody>
       </p:sp>
@@ -1636,7 +1659,7 @@
           <a:p>
             <a:fld id="{7C970ED3-5561-46E0-A85F-5E16F88FFCA8}" type="slidenum">
               <a:rPr lang="en-GB" smtClean="0"/>
-              <a:t>9</a:t>
+              <a:t>8</a:t>
             </a:fld>
             <a:endParaRPr lang="en-GB"/>
           </a:p>
@@ -1645,7 +1668,7 @@
     </p:spTree>
     <p:extLst>
       <p:ext uri="{BB962C8B-B14F-4D97-AF65-F5344CB8AC3E}">
-        <p14:creationId xmlns:p14="http://schemas.microsoft.com/office/powerpoint/2010/main" val="1066295912"/>
+        <p14:creationId xmlns:p14="http://schemas.microsoft.com/office/powerpoint/2010/main" val="1022678564"/>
       </p:ext>
     </p:extLst>
   </p:cSld>
@@ -1699,6 +1722,90 @@
           <a:bodyPr/>
           <a:lstStyle/>
           <a:p>
+            <a:endParaRPr lang="en-GB" dirty="0"/>
+          </a:p>
+        </p:txBody>
+      </p:sp>
+      <p:sp>
+        <p:nvSpPr>
+          <p:cNvPr id="4" name="Slide Number Placeholder 3"/>
+          <p:cNvSpPr>
+            <a:spLocks noGrp="1"/>
+          </p:cNvSpPr>
+          <p:nvPr>
+            <p:ph type="sldNum" sz="quarter" idx="5"/>
+          </p:nvPr>
+        </p:nvSpPr>
+        <p:spPr/>
+        <p:txBody>
+          <a:bodyPr/>
+          <a:lstStyle/>
+          <a:p>
+            <a:fld id="{7C970ED3-5561-46E0-A85F-5E16F88FFCA8}" type="slidenum">
+              <a:rPr lang="en-GB" smtClean="0"/>
+              <a:t>9</a:t>
+            </a:fld>
+            <a:endParaRPr lang="en-GB"/>
+          </a:p>
+        </p:txBody>
+      </p:sp>
+    </p:spTree>
+    <p:extLst>
+      <p:ext uri="{BB962C8B-B14F-4D97-AF65-F5344CB8AC3E}">
+        <p14:creationId xmlns:p14="http://schemas.microsoft.com/office/powerpoint/2010/main" val="1066295912"/>
+      </p:ext>
+    </p:extLst>
+  </p:cSld>
+  <p:clrMapOvr>
+    <a:masterClrMapping/>
+  </p:clrMapOvr>
+</p:notes>
+</file>
+
+<file path=ppt/notesSlides/notesSlide5.xml><?xml version="1.0" encoding="utf-8"?>
+<p:notes xmlns:a="http://schemas.openxmlformats.org/drawingml/2006/main" xmlns:r="http://schemas.openxmlformats.org/officeDocument/2006/relationships" xmlns:p="http://schemas.openxmlformats.org/presentationml/2006/main">
+  <p:cSld>
+    <p:spTree>
+      <p:nvGrpSpPr>
+        <p:cNvPr id="1" name=""/>
+        <p:cNvGrpSpPr/>
+        <p:nvPr/>
+      </p:nvGrpSpPr>
+      <p:grpSpPr>
+        <a:xfrm>
+          <a:off x="0" y="0"/>
+          <a:ext cx="0" cy="0"/>
+          <a:chOff x="0" y="0"/>
+          <a:chExt cx="0" cy="0"/>
+        </a:xfrm>
+      </p:grpSpPr>
+      <p:sp>
+        <p:nvSpPr>
+          <p:cNvPr id="2" name="Slide Image Placeholder 1"/>
+          <p:cNvSpPr>
+            <a:spLocks noGrp="1" noRot="1" noChangeAspect="1"/>
+          </p:cNvSpPr>
+          <p:nvPr>
+            <p:ph type="sldImg"/>
+          </p:nvPr>
+        </p:nvSpPr>
+        <p:spPr/>
+      </p:sp>
+      <p:sp>
+        <p:nvSpPr>
+          <p:cNvPr id="3" name="Notes Placeholder 2"/>
+          <p:cNvSpPr>
+            <a:spLocks noGrp="1"/>
+          </p:cNvSpPr>
+          <p:nvPr>
+            <p:ph type="body" idx="1"/>
+          </p:nvPr>
+        </p:nvSpPr>
+        <p:spPr/>
+        <p:txBody>
+          <a:bodyPr/>
+          <a:lstStyle/>
+          <a:p>
             <a:r>
               <a:rPr lang="en-GB" sz="1200" b="0" i="0" u="none" strike="noStrike" kern="1200" dirty="0">
                 <a:solidFill>
@@ -1819,7 +1926,7 @@
 </p:notes>
 </file>
 
-<file path=ppt/notesSlides/notesSlide5.xml><?xml version="1.0" encoding="utf-8"?>
+<file path=ppt/notesSlides/notesSlide6.xml><?xml version="1.0" encoding="utf-8"?>
 <p:notes xmlns:a="http://schemas.openxmlformats.org/drawingml/2006/main" xmlns:r="http://schemas.openxmlformats.org/officeDocument/2006/relationships" xmlns:p="http://schemas.openxmlformats.org/presentationml/2006/main">
   <p:cSld>
     <p:spTree>
@@ -2034,7 +2141,7 @@
           <a:p>
             <a:fld id="{EADA9985-F9B8-4E11-8A40-B153142C5EE0}" type="datetimeFigureOut">
               <a:rPr lang="en-GB" smtClean="0"/>
-              <a:t>18/10/2022</a:t>
+              <a:t>17/10/2023</a:t>
             </a:fld>
             <a:endParaRPr lang="en-GB"/>
           </a:p>
@@ -2279,7 +2386,7 @@
           <a:p>
             <a:fld id="{EADA9985-F9B8-4E11-8A40-B153142C5EE0}" type="datetimeFigureOut">
               <a:rPr lang="en-GB" smtClean="0"/>
-              <a:t>18/10/2022</a:t>
+              <a:t>17/10/2023</a:t>
             </a:fld>
             <a:endParaRPr lang="en-GB"/>
           </a:p>
@@ -2459,7 +2566,7 @@
           <a:p>
             <a:fld id="{EADA9985-F9B8-4E11-8A40-B153142C5EE0}" type="datetimeFigureOut">
               <a:rPr lang="en-GB" smtClean="0"/>
-              <a:t>18/10/2022</a:t>
+              <a:t>17/10/2023</a:t>
             </a:fld>
             <a:endParaRPr lang="en-GB"/>
           </a:p>
@@ -2629,7 +2736,7 @@
           <a:p>
             <a:fld id="{EADA9985-F9B8-4E11-8A40-B153142C5EE0}" type="datetimeFigureOut">
               <a:rPr lang="en-GB" smtClean="0"/>
-              <a:t>18/10/2022</a:t>
+              <a:t>17/10/2023</a:t>
             </a:fld>
             <a:endParaRPr lang="en-GB"/>
           </a:p>
@@ -2911,7 +3018,7 @@
           <a:p>
             <a:fld id="{EADA9985-F9B8-4E11-8A40-B153142C5EE0}" type="datetimeFigureOut">
               <a:rPr lang="en-GB" smtClean="0"/>
-              <a:t>18/10/2022</a:t>
+              <a:t>17/10/2023</a:t>
             </a:fld>
             <a:endParaRPr lang="en-GB"/>
           </a:p>
@@ -3143,7 +3250,7 @@
           <a:p>
             <a:fld id="{EADA9985-F9B8-4E11-8A40-B153142C5EE0}" type="datetimeFigureOut">
               <a:rPr lang="en-GB" smtClean="0"/>
-              <a:t>18/10/2022</a:t>
+              <a:t>17/10/2023</a:t>
             </a:fld>
             <a:endParaRPr lang="en-GB"/>
           </a:p>
@@ -3510,7 +3617,7 @@
           <a:p>
             <a:fld id="{EADA9985-F9B8-4E11-8A40-B153142C5EE0}" type="datetimeFigureOut">
               <a:rPr lang="en-GB" smtClean="0"/>
-              <a:t>18/10/2022</a:t>
+              <a:t>17/10/2023</a:t>
             </a:fld>
             <a:endParaRPr lang="en-GB"/>
           </a:p>
@@ -3628,7 +3735,7 @@
           <a:p>
             <a:fld id="{EADA9985-F9B8-4E11-8A40-B153142C5EE0}" type="datetimeFigureOut">
               <a:rPr lang="en-GB" smtClean="0"/>
-              <a:t>18/10/2022</a:t>
+              <a:t>17/10/2023</a:t>
             </a:fld>
             <a:endParaRPr lang="en-GB"/>
           </a:p>
@@ -3723,7 +3830,7 @@
           <a:p>
             <a:fld id="{EADA9985-F9B8-4E11-8A40-B153142C5EE0}" type="datetimeFigureOut">
               <a:rPr lang="en-GB" smtClean="0"/>
-              <a:t>18/10/2022</a:t>
+              <a:t>17/10/2023</a:t>
             </a:fld>
             <a:endParaRPr lang="en-GB"/>
           </a:p>
@@ -4000,7 +4107,7 @@
           <a:p>
             <a:fld id="{EADA9985-F9B8-4E11-8A40-B153142C5EE0}" type="datetimeFigureOut">
               <a:rPr lang="en-GB" smtClean="0"/>
-              <a:t>18/10/2022</a:t>
+              <a:t>17/10/2023</a:t>
             </a:fld>
             <a:endParaRPr lang="en-GB"/>
           </a:p>
@@ -4253,7 +4360,7 @@
           <a:p>
             <a:fld id="{EADA9985-F9B8-4E11-8A40-B153142C5EE0}" type="datetimeFigureOut">
               <a:rPr lang="en-GB" smtClean="0"/>
-              <a:t>18/10/2022</a:t>
+              <a:t>17/10/2023</a:t>
             </a:fld>
             <a:endParaRPr lang="en-GB"/>
           </a:p>
@@ -4466,7 +4573,7 @@
           <a:p>
             <a:fld id="{EADA9985-F9B8-4E11-8A40-B153142C5EE0}" type="datetimeFigureOut">
               <a:rPr lang="en-GB" smtClean="0"/>
-              <a:t>18/10/2022</a:t>
+              <a:t>17/10/2023</a:t>
             </a:fld>
             <a:endParaRPr lang="en-GB"/>
           </a:p>
@@ -5048,8 +5155,8 @@
           </a:p>
         </p:txBody>
       </p:sp>
-      <mc:AlternateContent xmlns:mc="http://schemas.openxmlformats.org/markup-compatibility/2006">
-        <mc:Choice xmlns:a14="http://schemas.microsoft.com/office/drawing/2010/main" Requires="a14">
+      <mc:AlternateContent xmlns:mc="http://schemas.openxmlformats.org/markup-compatibility/2006" xmlns:a14="http://schemas.microsoft.com/office/drawing/2010/main">
+        <mc:Choice Requires="a14">
           <p:sp>
             <p:nvSpPr>
               <p:cNvPr id="3" name="Content Placeholder 2">
@@ -5325,7 +5432,7 @@
             </p:txBody>
           </p:sp>
         </mc:Choice>
-        <mc:Fallback>
+        <mc:Fallback xmlns="">
           <p:sp>
             <p:nvSpPr>
               <p:cNvPr id="3" name="Content Placeholder 2">
@@ -8013,7 +8120,7 @@
         <p:spPr>
           <a:xfrm>
             <a:off x="6835698" y="499554"/>
-            <a:ext cx="4048801" cy="369332"/>
+            <a:ext cx="4911857" cy="369332"/>
           </a:xfrm>
           <a:prstGeom prst="rect">
             <a:avLst/>
@@ -8028,7 +8135,7 @@
           <a:p>
             <a:r>
               <a:rPr lang="en-GB" dirty="0"/>
-              <a:t>Ride discomfort (lines of equal tolerance)</a:t>
+              <a:t>Ride discomfort (lines of equal tolerance) - vertical</a:t>
             </a:r>
           </a:p>
         </p:txBody>
@@ -8186,6 +8293,41 @@
           </a:extLst>
         </p:spPr>
       </p:pic>
+      <p:sp>
+        <p:nvSpPr>
+          <p:cNvPr id="4" name="TextBox 3">
+            <a:extLst>
+              <a:ext uri="{FF2B5EF4-FFF2-40B4-BE49-F238E27FC236}">
+                <a16:creationId xmlns:a16="http://schemas.microsoft.com/office/drawing/2014/main" id="{CF4BC1FD-1DF3-374B-1C61-B26512F733D4}"/>
+              </a:ext>
+            </a:extLst>
+          </p:cNvPr>
+          <p:cNvSpPr txBox="1"/>
+          <p:nvPr/>
+        </p:nvSpPr>
+        <p:spPr>
+          <a:xfrm>
+            <a:off x="6289046" y="690138"/>
+            <a:ext cx="4977325" cy="369332"/>
+          </a:xfrm>
+          <a:prstGeom prst="rect">
+            <a:avLst/>
+          </a:prstGeom>
+          <a:noFill/>
+        </p:spPr>
+        <p:txBody>
+          <a:bodyPr wrap="none" rtlCol="0">
+            <a:spAutoFit/>
+          </a:bodyPr>
+          <a:lstStyle/>
+          <a:p>
+            <a:r>
+              <a:rPr lang="en-GB" dirty="0"/>
+              <a:t>Ride discomfort (lines of equal tolerance) – fore-aft</a:t>
+            </a:r>
+          </a:p>
+        </p:txBody>
+      </p:sp>
     </p:spTree>
     <p:extLst>
       <p:ext uri="{BB962C8B-B14F-4D97-AF65-F5344CB8AC3E}">
@@ -9705,7 +9847,7 @@
           <p:nvPr/>
         </p:nvPicPr>
         <p:blipFill>
-          <a:blip r:embed="rId2"/>
+          <a:blip r:embed="rId3"/>
           <a:stretch>
             <a:fillRect/>
           </a:stretch>
@@ -9735,7 +9877,7 @@
           <p:nvPr/>
         </p:nvPicPr>
         <p:blipFill>
-          <a:blip r:embed="rId3"/>
+          <a:blip r:embed="rId4"/>
           <a:stretch>
             <a:fillRect/>
           </a:stretch>
@@ -9765,7 +9907,7 @@
           <p:nvPr/>
         </p:nvPicPr>
         <p:blipFill>
-          <a:blip r:embed="rId4"/>
+          <a:blip r:embed="rId5"/>
           <a:stretch>
             <a:fillRect/>
           </a:stretch>
@@ -10077,8 +10219,8 @@
           </a:p>
         </p:txBody>
       </p:sp>
-      <mc:AlternateContent xmlns:mc="http://schemas.openxmlformats.org/markup-compatibility/2006">
-        <mc:Choice xmlns:a14="http://schemas.microsoft.com/office/drawing/2010/main" Requires="a14">
+      <mc:AlternateContent xmlns:mc="http://schemas.openxmlformats.org/markup-compatibility/2006" xmlns:a14="http://schemas.microsoft.com/office/drawing/2010/main">
+        <mc:Choice Requires="a14">
           <p:sp>
             <p:nvSpPr>
               <p:cNvPr id="3" name="Content Placeholder 2">
@@ -10663,7 +10805,7 @@
             </p:txBody>
           </p:sp>
         </mc:Choice>
-        <mc:Fallback>
+        <mc:Fallback xmlns="">
           <p:sp>
             <p:nvSpPr>
               <p:cNvPr id="3" name="Content Placeholder 2">

</xml_diff>